<commit_message>
added contrude overview to präsi #26
</commit_message>
<xml_diff>
--- a/Diplomarbeit/doc/Presentations/DA-Präsentation2024_Erstpräsentation.pptx
+++ b/Diplomarbeit/doc/Presentations/DA-Präsentation2024_Erstpräsentation.pptx
@@ -5,10 +5,10 @@
     <p:sldMasterId id="2147483648" r:id="rId4"/>
   </p:sldMasterIdLst>
   <p:notesMasterIdLst>
-    <p:notesMasterId r:id="rId15"/>
+    <p:notesMasterId r:id="rId16"/>
   </p:notesMasterIdLst>
   <p:handoutMasterIdLst>
-    <p:handoutMasterId r:id="rId16"/>
+    <p:handoutMasterId r:id="rId17"/>
   </p:handoutMasterIdLst>
   <p:sldIdLst>
     <p:sldId id="256" r:id="rId5"/>
@@ -20,7 +20,8 @@
     <p:sldId id="2587" r:id="rId11"/>
     <p:sldId id="2586" r:id="rId12"/>
     <p:sldId id="2590" r:id="rId13"/>
-    <p:sldId id="2591" r:id="rId14"/>
+    <p:sldId id="2592" r:id="rId14"/>
+    <p:sldId id="2591" r:id="rId15"/>
   </p:sldIdLst>
   <p:sldSz cx="12192000" cy="6858000"/>
   <p:notesSz cx="7099300" cy="10234613"/>
@@ -245,7 +246,7 @@
             <a:fld id="{4597EA2D-D11E-4F11-940E-96FC3DC86B48}" type="datetimeFigureOut">
               <a:rPr lang="de-DE" smtClean="0"/>
               <a:pPr/>
-              <a:t>30.05.2024</a:t>
+              <a:t>04.06.2024</a:t>
             </a:fld>
             <a:endParaRPr lang="de-AT"/>
           </a:p>
@@ -412,7 +413,7 @@
             <a:fld id="{25FA59D5-1C02-4780-AF81-09ADAD492357}" type="datetimeFigureOut">
               <a:rPr lang="de-AT" smtClean="0"/>
               <a:pPr/>
-              <a:t>30.05.2024</a:t>
+              <a:t>04.06.2024</a:t>
             </a:fld>
             <a:endParaRPr lang="de-AT"/>
           </a:p>
@@ -1120,7 +1121,7 @@
           <a:p>
             <a:fld id="{903DBAB2-6CCA-40C7-8885-2C056A77E284}" type="datetime1">
               <a:rPr lang="de-AT" smtClean="0"/>
-              <a:t>30.05.2024</a:t>
+              <a:t>04.06.2024</a:t>
             </a:fld>
             <a:endParaRPr lang="de-AT"/>
           </a:p>
@@ -1292,13 +1293,13 @@
   <p:clrMapOvr>
     <a:masterClrMapping/>
   </p:clrMapOvr>
-  <mc:AlternateContent xmlns:mc="http://schemas.openxmlformats.org/markup-compatibility/2006">
-    <mc:Choice xmlns:p159="http://schemas.microsoft.com/office/powerpoint/2015/09/main" Requires="p159">
+  <mc:AlternateContent xmlns:mc="http://schemas.openxmlformats.org/markup-compatibility/2006" xmlns:p159="http://schemas.microsoft.com/office/powerpoint/2015/09/main">
+    <mc:Choice Requires="p159">
       <p:transition xmlns:p14="http://schemas.microsoft.com/office/powerpoint/2010/main" spd="slow" p14:dur="2000">
         <p159:morph option="byObject"/>
       </p:transition>
     </mc:Choice>
-    <mc:Fallback>
+    <mc:Fallback xmlns="">
       <p:transition spd="slow">
         <p:fade/>
       </p:transition>
@@ -1475,7 +1476,7 @@
           <a:p>
             <a:fld id="{CFFB591F-AE7F-406B-977E-415D708CD05B}" type="datetime1">
               <a:rPr lang="de-AT" smtClean="0"/>
-              <a:t>30.05.2024</a:t>
+              <a:t>04.06.2024</a:t>
             </a:fld>
             <a:endParaRPr lang="de-AT"/>
           </a:p>
@@ -1678,13 +1679,13 @@
   <p:clrMapOvr>
     <a:masterClrMapping/>
   </p:clrMapOvr>
-  <mc:AlternateContent xmlns:mc="http://schemas.openxmlformats.org/markup-compatibility/2006">
-    <mc:Choice xmlns:p159="http://schemas.microsoft.com/office/powerpoint/2015/09/main" Requires="p159">
+  <mc:AlternateContent xmlns:mc="http://schemas.openxmlformats.org/markup-compatibility/2006" xmlns:p159="http://schemas.microsoft.com/office/powerpoint/2015/09/main">
+    <mc:Choice Requires="p159">
       <p:transition xmlns:p14="http://schemas.microsoft.com/office/powerpoint/2010/main" spd="slow" p14:dur="2000">
         <p159:morph option="byObject"/>
       </p:transition>
     </mc:Choice>
-    <mc:Fallback>
+    <mc:Fallback xmlns="">
       <p:transition spd="slow">
         <p:fade/>
       </p:transition>
@@ -1955,7 +1956,7 @@
           <a:p>
             <a:fld id="{DDED4213-31A7-43A9-B381-650B72838F3D}" type="datetime1">
               <a:rPr lang="de-AT" smtClean="0"/>
-              <a:t>30.05.2024</a:t>
+              <a:t>04.06.2024</a:t>
             </a:fld>
             <a:endParaRPr lang="de-AT"/>
           </a:p>
@@ -2176,13 +2177,13 @@
   <p:clrMapOvr>
     <a:masterClrMapping/>
   </p:clrMapOvr>
-  <mc:AlternateContent xmlns:mc="http://schemas.openxmlformats.org/markup-compatibility/2006">
-    <mc:Choice xmlns:p159="http://schemas.microsoft.com/office/powerpoint/2015/09/main" Requires="p159">
+  <mc:AlternateContent xmlns:mc="http://schemas.openxmlformats.org/markup-compatibility/2006" xmlns:p159="http://schemas.microsoft.com/office/powerpoint/2015/09/main">
+    <mc:Choice Requires="p159">
       <p:transition xmlns:p14="http://schemas.microsoft.com/office/powerpoint/2010/main" spd="slow" p14:dur="2000">
         <p159:morph option="byObject"/>
       </p:transition>
     </mc:Choice>
-    <mc:Fallback>
+    <mc:Fallback xmlns="">
       <p:transition spd="slow">
         <p:fade/>
       </p:transition>
@@ -2587,7 +2588,7 @@
           <a:p>
             <a:fld id="{73623C63-4118-48BA-956A-11DEEC1AA07D}" type="datetime1">
               <a:rPr lang="de-AT" smtClean="0"/>
-              <a:t>30.05.2024</a:t>
+              <a:t>04.06.2024</a:t>
             </a:fld>
             <a:endParaRPr lang="de-AT"/>
           </a:p>
@@ -2808,13 +2809,13 @@
   <p:clrMapOvr>
     <a:masterClrMapping/>
   </p:clrMapOvr>
-  <mc:AlternateContent xmlns:mc="http://schemas.openxmlformats.org/markup-compatibility/2006">
-    <mc:Choice xmlns:p159="http://schemas.microsoft.com/office/powerpoint/2015/09/main" Requires="p159">
+  <mc:AlternateContent xmlns:mc="http://schemas.openxmlformats.org/markup-compatibility/2006" xmlns:p159="http://schemas.microsoft.com/office/powerpoint/2015/09/main">
+    <mc:Choice Requires="p159">
       <p:transition xmlns:p14="http://schemas.microsoft.com/office/powerpoint/2010/main" spd="slow" p14:dur="2000">
         <p159:morph option="byObject"/>
       </p:transition>
     </mc:Choice>
-    <mc:Fallback>
+    <mc:Fallback xmlns="">
       <p:transition spd="slow">
         <p:fade/>
       </p:transition>
@@ -2932,7 +2933,7 @@
           <a:p>
             <a:fld id="{D256D3EE-23A3-40C2-AAE3-0430D418E6CE}" type="datetime1">
               <a:rPr lang="de-AT" smtClean="0"/>
-              <a:t>30.05.2024</a:t>
+              <a:t>04.06.2024</a:t>
             </a:fld>
             <a:endParaRPr lang="de-AT"/>
           </a:p>
@@ -2994,13 +2995,13 @@
   <p:clrMapOvr>
     <a:masterClrMapping/>
   </p:clrMapOvr>
-  <mc:AlternateContent xmlns:mc="http://schemas.openxmlformats.org/markup-compatibility/2006">
-    <mc:Choice xmlns:p159="http://schemas.microsoft.com/office/powerpoint/2015/09/main" Requires="p159">
+  <mc:AlternateContent xmlns:mc="http://schemas.openxmlformats.org/markup-compatibility/2006" xmlns:p159="http://schemas.microsoft.com/office/powerpoint/2015/09/main">
+    <mc:Choice Requires="p159">
       <p:transition xmlns:p14="http://schemas.microsoft.com/office/powerpoint/2010/main" spd="slow" p14:dur="2000">
         <p159:morph option="byObject"/>
       </p:transition>
     </mc:Choice>
-    <mc:Fallback>
+    <mc:Fallback xmlns="">
       <p:transition spd="slow">
         <p:fade/>
       </p:transition>
@@ -3128,7 +3129,7 @@
           <a:p>
             <a:fld id="{3FE2F795-10B4-41AA-AEDE-F815B308DCDB}" type="datetime1">
               <a:rPr lang="de-AT" smtClean="0"/>
-              <a:t>30.05.2024</a:t>
+              <a:t>04.06.2024</a:t>
             </a:fld>
             <a:endParaRPr lang="de-AT"/>
           </a:p>
@@ -3190,13 +3191,13 @@
   <p:clrMapOvr>
     <a:masterClrMapping/>
   </p:clrMapOvr>
-  <mc:AlternateContent xmlns:mc="http://schemas.openxmlformats.org/markup-compatibility/2006">
-    <mc:Choice xmlns:p159="http://schemas.microsoft.com/office/powerpoint/2015/09/main" Requires="p159">
+  <mc:AlternateContent xmlns:mc="http://schemas.openxmlformats.org/markup-compatibility/2006" xmlns:p159="http://schemas.microsoft.com/office/powerpoint/2015/09/main">
+    <mc:Choice Requires="p159">
       <p:transition xmlns:p14="http://schemas.microsoft.com/office/powerpoint/2010/main" spd="slow" p14:dur="2000">
         <p159:morph option="byObject"/>
       </p:transition>
     </mc:Choice>
-    <mc:Fallback>
+    <mc:Fallback xmlns="">
       <p:transition spd="slow">
         <p:fade/>
       </p:transition>
@@ -3353,7 +3354,7 @@
           <a:p>
             <a:fld id="{03FB355E-663F-46F6-A58A-7E827B834F26}" type="datetime1">
               <a:rPr lang="de-AT" smtClean="0"/>
-              <a:t>30.05.2024</a:t>
+              <a:t>04.06.2024</a:t>
             </a:fld>
             <a:endParaRPr lang="de-AT"/>
           </a:p>
@@ -3457,13 +3458,13 @@
     <p:sldLayoutId id="2147483658" r:id="rId5"/>
     <p:sldLayoutId id="2147483659" r:id="rId6"/>
   </p:sldLayoutIdLst>
-  <mc:AlternateContent xmlns:mc="http://schemas.openxmlformats.org/markup-compatibility/2006">
-    <mc:Choice xmlns:p159="http://schemas.microsoft.com/office/powerpoint/2015/09/main" Requires="p159">
+  <mc:AlternateContent xmlns:mc="http://schemas.openxmlformats.org/markup-compatibility/2006" xmlns:p159="http://schemas.microsoft.com/office/powerpoint/2015/09/main">
+    <mc:Choice Requires="p159">
       <p:transition xmlns:p14="http://schemas.microsoft.com/office/powerpoint/2010/main" spd="slow" p14:dur="2000">
         <p159:morph option="byObject"/>
       </p:transition>
     </mc:Choice>
-    <mc:Fallback>
+    <mc:Fallback xmlns="">
       <p:transition spd="slow">
         <p:fade/>
       </p:transition>
@@ -3883,7 +3884,7 @@
             <a:pPr algn="r"/>
             <a:fld id="{8EA2BAE2-6757-47A9-8E17-82B3704991C6}" type="datetime4">
               <a:rPr lang="de-AT" smtClean="0"/>
-              <a:t>30. Mai 2024</a:t>
+              <a:t>4. Juni 2024</a:t>
             </a:fld>
             <a:endParaRPr lang="de-AT"/>
           </a:p>
@@ -4230,13 +4231,13 @@
   <p:clrMapOvr>
     <a:masterClrMapping/>
   </p:clrMapOvr>
-  <mc:AlternateContent xmlns:mc="http://schemas.openxmlformats.org/markup-compatibility/2006">
-    <mc:Choice xmlns:p159="http://schemas.microsoft.com/office/powerpoint/2015/09/main" Requires="p159">
+  <mc:AlternateContent xmlns:mc="http://schemas.openxmlformats.org/markup-compatibility/2006" xmlns:p159="http://schemas.microsoft.com/office/powerpoint/2015/09/main">
+    <mc:Choice Requires="p159">
       <p:transition xmlns:p14="http://schemas.microsoft.com/office/powerpoint/2010/main" spd="slow" p14:dur="2000">
         <p159:morph option="byObject"/>
       </p:transition>
     </mc:Choice>
-    <mc:Fallback>
+    <mc:Fallback xmlns="">
       <p:transition spd="slow">
         <p:fade/>
       </p:transition>
@@ -4267,6 +4268,172 @@
           <p:cNvPr id="2" name="Titel 1">
             <a:extLst>
               <a:ext uri="{FF2B5EF4-FFF2-40B4-BE49-F238E27FC236}">
+                <a16:creationId xmlns:a16="http://schemas.microsoft.com/office/drawing/2014/main" id="{41705578-676D-FCCF-F067-38289B99C507}"/>
+              </a:ext>
+            </a:extLst>
+          </p:cNvPr>
+          <p:cNvSpPr>
+            <a:spLocks noGrp="1"/>
+          </p:cNvSpPr>
+          <p:nvPr>
+            <p:ph type="title"/>
+          </p:nvPr>
+        </p:nvSpPr>
+        <p:spPr/>
+        <p:txBody>
+          <a:bodyPr/>
+          <a:lstStyle/>
+          <a:p>
+            <a:r>
+              <a:rPr lang="de-AT" dirty="0"/>
+              <a:t>Struktur</a:t>
+            </a:r>
+          </a:p>
+        </p:txBody>
+      </p:sp>
+      <p:pic>
+        <p:nvPicPr>
+          <p:cNvPr id="7" name="Inhaltsplatzhalter 6">
+            <a:extLst>
+              <a:ext uri="{FF2B5EF4-FFF2-40B4-BE49-F238E27FC236}">
+                <a16:creationId xmlns:a16="http://schemas.microsoft.com/office/drawing/2014/main" id="{AFE89A80-B440-BF16-0152-F50CC3E17FFA}"/>
+              </a:ext>
+            </a:extLst>
+          </p:cNvPr>
+          <p:cNvPicPr>
+            <a:picLocks noGrp="1" noChangeAspect="1"/>
+          </p:cNvPicPr>
+          <p:nvPr>
+            <p:ph idx="1"/>
+          </p:nvPr>
+        </p:nvPicPr>
+        <p:blipFill>
+          <a:blip r:embed="rId2">
+            <a:extLst>
+              <a:ext uri="{28A0092B-C50C-407E-A947-70E740481C1C}">
+                <a14:useLocalDpi xmlns:a14="http://schemas.microsoft.com/office/drawing/2010/main" val="0"/>
+              </a:ext>
+              <a:ext uri="{96DAC541-7B7A-43D3-8B79-37D633B846F1}">
+                <asvg:svgBlip xmlns:asvg="http://schemas.microsoft.com/office/drawing/2016/SVG/main" r:embed="rId3"/>
+              </a:ext>
+            </a:extLst>
+          </a:blip>
+          <a:stretch>
+            <a:fillRect/>
+          </a:stretch>
+        </p:blipFill>
+        <p:spPr>
+          <a:xfrm>
+            <a:off x="2173760" y="1095711"/>
+            <a:ext cx="7844479" cy="5073650"/>
+          </a:xfrm>
+        </p:spPr>
+      </p:pic>
+      <p:sp>
+        <p:nvSpPr>
+          <p:cNvPr id="4" name="Fußzeilenplatzhalter 3">
+            <a:extLst>
+              <a:ext uri="{FF2B5EF4-FFF2-40B4-BE49-F238E27FC236}">
+                <a16:creationId xmlns:a16="http://schemas.microsoft.com/office/drawing/2014/main" id="{68EE335B-B2E2-9F37-0D30-DC40083206F5}"/>
+              </a:ext>
+            </a:extLst>
+          </p:cNvPr>
+          <p:cNvSpPr>
+            <a:spLocks noGrp="1"/>
+          </p:cNvSpPr>
+          <p:nvPr>
+            <p:ph type="ftr" sz="quarter" idx="11"/>
+          </p:nvPr>
+        </p:nvSpPr>
+        <p:spPr/>
+        <p:txBody>
+          <a:bodyPr/>
+          <a:lstStyle/>
+          <a:p>
+            <a:r>
+              <a:rPr lang="de-AT" dirty="0"/>
+              <a:t>CONTRUDE Gekle, Kampl, Schrempf</a:t>
+            </a:r>
+          </a:p>
+        </p:txBody>
+      </p:sp>
+      <p:sp>
+        <p:nvSpPr>
+          <p:cNvPr id="5" name="Foliennummernplatzhalter 4">
+            <a:extLst>
+              <a:ext uri="{FF2B5EF4-FFF2-40B4-BE49-F238E27FC236}">
+                <a16:creationId xmlns:a16="http://schemas.microsoft.com/office/drawing/2014/main" id="{C505ED6E-17E1-8489-2A55-B1355FDF1AC1}"/>
+              </a:ext>
+            </a:extLst>
+          </p:cNvPr>
+          <p:cNvSpPr>
+            <a:spLocks noGrp="1"/>
+          </p:cNvSpPr>
+          <p:nvPr>
+            <p:ph type="sldNum" sz="quarter" idx="12"/>
+          </p:nvPr>
+        </p:nvSpPr>
+        <p:spPr/>
+        <p:txBody>
+          <a:bodyPr/>
+          <a:lstStyle/>
+          <a:p>
+            <a:fld id="{7DCD6803-3BAA-44F6-A698-23D950C9713B}" type="slidenum">
+              <a:rPr lang="de-AT" smtClean="0"/>
+              <a:pPr/>
+              <a:t>10</a:t>
+            </a:fld>
+            <a:endParaRPr lang="de-AT"/>
+          </a:p>
+        </p:txBody>
+      </p:sp>
+    </p:spTree>
+    <p:extLst>
+      <p:ext uri="{BB962C8B-B14F-4D97-AF65-F5344CB8AC3E}">
+        <p14:creationId xmlns:p14="http://schemas.microsoft.com/office/powerpoint/2010/main" val="3150432457"/>
+      </p:ext>
+    </p:extLst>
+  </p:cSld>
+  <p:clrMapOvr>
+    <a:masterClrMapping/>
+  </p:clrMapOvr>
+  <mc:AlternateContent xmlns:mc="http://schemas.openxmlformats.org/markup-compatibility/2006" xmlns:p159="http://schemas.microsoft.com/office/powerpoint/2015/09/main">
+    <mc:Choice Requires="p159">
+      <p:transition xmlns:p14="http://schemas.microsoft.com/office/powerpoint/2010/main" spd="slow" p14:dur="2000">
+        <p159:morph option="byObject"/>
+      </p:transition>
+    </mc:Choice>
+    <mc:Fallback xmlns="">
+      <p:transition spd="slow">
+        <p:fade/>
+      </p:transition>
+    </mc:Fallback>
+  </mc:AlternateContent>
+</p:sld>
+</file>
+
+<file path=ppt/slides/slide11.xml><?xml version="1.0" encoding="utf-8"?>
+<p:sld xmlns:a="http://schemas.openxmlformats.org/drawingml/2006/main" xmlns:r="http://schemas.openxmlformats.org/officeDocument/2006/relationships" xmlns:p="http://schemas.openxmlformats.org/presentationml/2006/main">
+  <p:cSld>
+    <p:spTree>
+      <p:nvGrpSpPr>
+        <p:cNvPr id="1" name=""/>
+        <p:cNvGrpSpPr/>
+        <p:nvPr/>
+      </p:nvGrpSpPr>
+      <p:grpSpPr>
+        <a:xfrm>
+          <a:off x="0" y="0"/>
+          <a:ext cx="0" cy="0"/>
+          <a:chOff x="0" y="0"/>
+          <a:chExt cx="0" cy="0"/>
+        </a:xfrm>
+      </p:grpSpPr>
+      <p:sp>
+        <p:nvSpPr>
+          <p:cNvPr id="2" name="Titel 1">
+            <a:extLst>
+              <a:ext uri="{FF2B5EF4-FFF2-40B4-BE49-F238E27FC236}">
                 <a16:creationId xmlns:a16="http://schemas.microsoft.com/office/drawing/2014/main" id="{49B75182-9F7E-DDB8-1BCE-29DCCA8443FA}"/>
               </a:ext>
             </a:extLst>
@@ -4391,7 +4558,7 @@
             <a:fld id="{7DCD6803-3BAA-44F6-A698-23D950C9713B}" type="slidenum">
               <a:rPr lang="de-AT" smtClean="0"/>
               <a:pPr/>
-              <a:t>10</a:t>
+              <a:t>11</a:t>
             </a:fld>
             <a:endParaRPr lang="de-AT"/>
           </a:p>
@@ -4407,13 +4574,13 @@
   <p:clrMapOvr>
     <a:masterClrMapping/>
   </p:clrMapOvr>
-  <mc:AlternateContent xmlns:mc="http://schemas.openxmlformats.org/markup-compatibility/2006">
-    <mc:Choice xmlns:p159="http://schemas.microsoft.com/office/powerpoint/2015/09/main" Requires="p159">
+  <mc:AlternateContent xmlns:mc="http://schemas.openxmlformats.org/markup-compatibility/2006" xmlns:p159="http://schemas.microsoft.com/office/powerpoint/2015/09/main">
+    <mc:Choice Requires="p159">
       <p:transition xmlns:p14="http://schemas.microsoft.com/office/powerpoint/2010/main" spd="slow" p14:dur="2000">
         <p159:morph option="byObject"/>
       </p:transition>
     </mc:Choice>
-    <mc:Fallback>
+    <mc:Fallback xmlns="">
       <p:transition spd="slow">
         <p:fade/>
       </p:transition>
@@ -4594,13 +4761,13 @@
   <p:clrMapOvr>
     <a:masterClrMapping/>
   </p:clrMapOvr>
-  <mc:AlternateContent xmlns:mc="http://schemas.openxmlformats.org/markup-compatibility/2006">
-    <mc:Choice xmlns:p159="http://schemas.microsoft.com/office/powerpoint/2015/09/main" Requires="p159">
+  <mc:AlternateContent xmlns:mc="http://schemas.openxmlformats.org/markup-compatibility/2006" xmlns:p159="http://schemas.microsoft.com/office/powerpoint/2015/09/main">
+    <mc:Choice Requires="p159">
       <p:transition xmlns:p14="http://schemas.microsoft.com/office/powerpoint/2010/main" spd="slow" p14:dur="2000">
         <p159:morph option="byObject"/>
       </p:transition>
     </mc:Choice>
-    <mc:Fallback>
+    <mc:Fallback xmlns="">
       <p:transition spd="slow">
         <p:fade/>
       </p:transition>
@@ -4809,13 +4976,13 @@
   <p:clrMapOvr>
     <a:masterClrMapping/>
   </p:clrMapOvr>
-  <mc:AlternateContent xmlns:mc="http://schemas.openxmlformats.org/markup-compatibility/2006">
-    <mc:Choice xmlns:p159="http://schemas.microsoft.com/office/powerpoint/2015/09/main" Requires="p159">
+  <mc:AlternateContent xmlns:mc="http://schemas.openxmlformats.org/markup-compatibility/2006" xmlns:p159="http://schemas.microsoft.com/office/powerpoint/2015/09/main">
+    <mc:Choice Requires="p159">
       <p:transition xmlns:p14="http://schemas.microsoft.com/office/powerpoint/2010/main" spd="slow" p14:dur="2000">
         <p159:morph option="byObject"/>
       </p:transition>
     </mc:Choice>
-    <mc:Fallback>
+    <mc:Fallback xmlns="">
       <p:transition spd="slow">
         <p:fade/>
       </p:transition>
@@ -4996,13 +5163,13 @@
   <p:clrMapOvr>
     <a:masterClrMapping/>
   </p:clrMapOvr>
-  <mc:AlternateContent xmlns:mc="http://schemas.openxmlformats.org/markup-compatibility/2006">
-    <mc:Choice xmlns:p159="http://schemas.microsoft.com/office/powerpoint/2015/09/main" Requires="p159">
+  <mc:AlternateContent xmlns:mc="http://schemas.openxmlformats.org/markup-compatibility/2006" xmlns:p159="http://schemas.microsoft.com/office/powerpoint/2015/09/main">
+    <mc:Choice Requires="p159">
       <p:transition xmlns:p14="http://schemas.microsoft.com/office/powerpoint/2010/main" spd="slow" p14:dur="2000">
         <p159:morph option="byObject"/>
       </p:transition>
     </mc:Choice>
-    <mc:Fallback>
+    <mc:Fallback xmlns="">
       <p:transition spd="slow">
         <p:fade/>
       </p:transition>
@@ -5231,13 +5398,13 @@
   <p:clrMapOvr>
     <a:masterClrMapping/>
   </p:clrMapOvr>
-  <mc:AlternateContent xmlns:mc="http://schemas.openxmlformats.org/markup-compatibility/2006">
-    <mc:Choice xmlns:p159="http://schemas.microsoft.com/office/powerpoint/2015/09/main" Requires="p159">
+  <mc:AlternateContent xmlns:mc="http://schemas.openxmlformats.org/markup-compatibility/2006" xmlns:p159="http://schemas.microsoft.com/office/powerpoint/2015/09/main">
+    <mc:Choice Requires="p159">
       <p:transition xmlns:p14="http://schemas.microsoft.com/office/powerpoint/2010/main" spd="slow" p14:dur="2000">
         <p159:morph option="byObject"/>
       </p:transition>
     </mc:Choice>
-    <mc:Fallback>
+    <mc:Fallback xmlns="">
       <p:transition spd="slow">
         <p:fade/>
       </p:transition>
@@ -5471,13 +5638,13 @@
   <p:clrMapOvr>
     <a:masterClrMapping/>
   </p:clrMapOvr>
-  <mc:AlternateContent xmlns:mc="http://schemas.openxmlformats.org/markup-compatibility/2006">
-    <mc:Choice xmlns:p159="http://schemas.microsoft.com/office/powerpoint/2015/09/main" Requires="p159">
+  <mc:AlternateContent xmlns:mc="http://schemas.openxmlformats.org/markup-compatibility/2006" xmlns:p159="http://schemas.microsoft.com/office/powerpoint/2015/09/main">
+    <mc:Choice Requires="p159">
       <p:transition xmlns:p14="http://schemas.microsoft.com/office/powerpoint/2010/main" spd="slow" p14:dur="2000">
         <p159:morph option="byObject"/>
       </p:transition>
     </mc:Choice>
-    <mc:Fallback>
+    <mc:Fallback xmlns="">
       <p:transition spd="slow">
         <p:fade/>
       </p:transition>
@@ -5706,13 +5873,13 @@
   <p:clrMapOvr>
     <a:masterClrMapping/>
   </p:clrMapOvr>
-  <mc:AlternateContent xmlns:mc="http://schemas.openxmlformats.org/markup-compatibility/2006">
-    <mc:Choice xmlns:p159="http://schemas.microsoft.com/office/powerpoint/2015/09/main" Requires="p159">
+  <mc:AlternateContent xmlns:mc="http://schemas.openxmlformats.org/markup-compatibility/2006" xmlns:p159="http://schemas.microsoft.com/office/powerpoint/2015/09/main">
+    <mc:Choice Requires="p159">
       <p:transition xmlns:p14="http://schemas.microsoft.com/office/powerpoint/2010/main" spd="slow" p14:dur="2000">
         <p159:morph option="byObject"/>
       </p:transition>
     </mc:Choice>
-    <mc:Fallback>
+    <mc:Fallback xmlns="">
       <p:transition spd="slow">
         <p:fade/>
       </p:transition>
@@ -5875,13 +6042,13 @@
   <p:clrMapOvr>
     <a:masterClrMapping/>
   </p:clrMapOvr>
-  <mc:AlternateContent xmlns:mc="http://schemas.openxmlformats.org/markup-compatibility/2006">
-    <mc:Choice xmlns:p159="http://schemas.microsoft.com/office/powerpoint/2015/09/main" Requires="p159">
+  <mc:AlternateContent xmlns:mc="http://schemas.openxmlformats.org/markup-compatibility/2006" xmlns:p159="http://schemas.microsoft.com/office/powerpoint/2015/09/main">
+    <mc:Choice Requires="p159">
       <p:transition xmlns:p14="http://schemas.microsoft.com/office/powerpoint/2010/main" spd="slow" p14:dur="2000">
         <p159:morph option="byObject"/>
       </p:transition>
     </mc:Choice>
-    <mc:Fallback>
+    <mc:Fallback xmlns="">
       <p:transition spd="slow">
         <p:fade/>
       </p:transition>
@@ -5961,7 +6128,7 @@
           <a:lstStyle/>
           <a:p>
             <a:r>
-              <a:rPr lang="de-AT"/>
+              <a:rPr lang="de-AT" dirty="0"/>
               <a:t>CONTRUDE Gekle, Kampl, Schrempf</a:t>
             </a:r>
           </a:p>
@@ -6036,13 +6203,13 @@
   <p:clrMapOvr>
     <a:masterClrMapping/>
   </p:clrMapOvr>
-  <mc:AlternateContent xmlns:mc="http://schemas.openxmlformats.org/markup-compatibility/2006">
-    <mc:Choice xmlns:p159="http://schemas.microsoft.com/office/powerpoint/2015/09/main" Requires="p159">
+  <mc:AlternateContent xmlns:mc="http://schemas.openxmlformats.org/markup-compatibility/2006" xmlns:p159="http://schemas.microsoft.com/office/powerpoint/2015/09/main">
+    <mc:Choice Requires="p159">
       <p:transition xmlns:p14="http://schemas.microsoft.com/office/powerpoint/2010/main" spd="slow" p14:dur="2000">
         <p159:morph option="byObject"/>
       </p:transition>
     </mc:Choice>
-    <mc:Fallback>
+    <mc:Fallback xmlns="">
       <p:transition spd="slow">
         <p:fade/>
       </p:transition>
@@ -6905,9 +7072,12 @@
 </file>
 
 <file path=customXml/item1.xml><?xml version="1.0" encoding="utf-8"?>
-<p:properties xmlns:p="http://schemas.microsoft.com/office/2006/metadata/properties" xmlns:xsi="http://www.w3.org/2001/XMLSchema-instance" xmlns:pc="http://schemas.microsoft.com/office/infopath/2007/PartnerControls">
-  <documentManagement/>
-</p:properties>
+<?mso-contentType ?>
+<FormTemplates xmlns="http://schemas.microsoft.com/sharepoint/v3/contenttype/forms">
+  <Display>DocumentLibraryForm</Display>
+  <Edit>DocumentLibraryForm</Edit>
+  <New>DocumentLibraryForm</New>
+</FormTemplates>
 </file>
 
 <file path=customXml/item2.xml><?xml version="1.0" encoding="utf-8"?>
@@ -7025,25 +7195,15 @@
 </file>
 
 <file path=customXml/item3.xml><?xml version="1.0" encoding="utf-8"?>
-<?mso-contentType ?>
-<FormTemplates xmlns="http://schemas.microsoft.com/sharepoint/v3/contenttype/forms">
-  <Display>DocumentLibraryForm</Display>
-  <Edit>DocumentLibraryForm</Edit>
-  <New>DocumentLibraryForm</New>
-</FormTemplates>
+<p:properties xmlns:p="http://schemas.microsoft.com/office/2006/metadata/properties" xmlns:xsi="http://www.w3.org/2001/XMLSchema-instance" xmlns:pc="http://schemas.microsoft.com/office/infopath/2007/PartnerControls">
+  <documentManagement/>
+</p:properties>
 </file>
 
 <file path=customXml/itemProps1.xml><?xml version="1.0" encoding="utf-8"?>
-<ds:datastoreItem xmlns:ds="http://schemas.openxmlformats.org/officeDocument/2006/customXml" ds:itemID="{91B09AE3-FA1D-40C8-A6CE-A2D9F55131C8}">
+<ds:datastoreItem xmlns:ds="http://schemas.openxmlformats.org/officeDocument/2006/customXml" ds:itemID="{A62B322D-2084-418A-8960-B074ADC5B6DB}">
   <ds:schemaRefs>
-    <ds:schemaRef ds:uri="http://purl.org/dc/dcmitype/"/>
-    <ds:schemaRef ds:uri="http://purl.org/dc/elements/1.1/"/>
-    <ds:schemaRef ds:uri="http://purl.org/dc/terms/"/>
-    <ds:schemaRef ds:uri="http://schemas.microsoft.com/office/2006/documentManagement/types"/>
-    <ds:schemaRef ds:uri="http://schemas.microsoft.com/office/2006/metadata/properties"/>
-    <ds:schemaRef ds:uri="http://schemas.microsoft.com/office/infopath/2007/PartnerControls"/>
-    <ds:schemaRef ds:uri="http://schemas.openxmlformats.org/package/2006/metadata/core-properties"/>
-    <ds:schemaRef ds:uri="http://www.w3.org/XML/1998/namespace"/>
+    <ds:schemaRef ds:uri="http://schemas.microsoft.com/sharepoint/v3/contenttype/forms"/>
   </ds:schemaRefs>
 </ds:datastoreItem>
 </file>
@@ -7065,9 +7225,16 @@
 </file>
 
 <file path=customXml/itemProps3.xml><?xml version="1.0" encoding="utf-8"?>
-<ds:datastoreItem xmlns:ds="http://schemas.openxmlformats.org/officeDocument/2006/customXml" ds:itemID="{A62B322D-2084-418A-8960-B074ADC5B6DB}">
+<ds:datastoreItem xmlns:ds="http://schemas.openxmlformats.org/officeDocument/2006/customXml" ds:itemID="{91B09AE3-FA1D-40C8-A6CE-A2D9F55131C8}">
   <ds:schemaRefs>
-    <ds:schemaRef ds:uri="http://schemas.microsoft.com/sharepoint/v3/contenttype/forms"/>
+    <ds:schemaRef ds:uri="http://purl.org/dc/dcmitype/"/>
+    <ds:schemaRef ds:uri="http://purl.org/dc/elements/1.1/"/>
+    <ds:schemaRef ds:uri="http://purl.org/dc/terms/"/>
+    <ds:schemaRef ds:uri="http://schemas.microsoft.com/office/2006/documentManagement/types"/>
+    <ds:schemaRef ds:uri="http://schemas.microsoft.com/office/2006/metadata/properties"/>
+    <ds:schemaRef ds:uri="http://schemas.microsoft.com/office/infopath/2007/PartnerControls"/>
+    <ds:schemaRef ds:uri="http://schemas.openxmlformats.org/package/2006/metadata/core-properties"/>
+    <ds:schemaRef ds:uri="http://www.w3.org/XML/1998/namespace"/>
   </ds:schemaRefs>
 </ds:datastoreItem>
 </file>
</xml_diff>

<commit_message>
Update to Presentation and renaming of Kostenrechnung
</commit_message>
<xml_diff>
--- a/Diplomarbeit/doc/Presentations/DA-Präsentation2024_Erstpräsentation.pptx
+++ b/Diplomarbeit/doc/Presentations/DA-Präsentation2024_Erstpräsentation.pptx
@@ -13,8 +13,8 @@
   <p:sldIdLst>
     <p:sldId id="256" r:id="rId5"/>
     <p:sldId id="2582" r:id="rId6"/>
-    <p:sldId id="2589" r:id="rId7"/>
-    <p:sldId id="2583" r:id="rId8"/>
+    <p:sldId id="2583" r:id="rId7"/>
+    <p:sldId id="2589" r:id="rId8"/>
     <p:sldId id="2584" r:id="rId9"/>
     <p:sldId id="2585" r:id="rId10"/>
     <p:sldId id="2587" r:id="rId11"/>
@@ -246,7 +246,7 @@
             <a:fld id="{4597EA2D-D11E-4F11-940E-96FC3DC86B48}" type="datetimeFigureOut">
               <a:rPr lang="de-DE" smtClean="0"/>
               <a:pPr/>
-              <a:t>04.06.2024</a:t>
+              <a:t>06.06.2024</a:t>
             </a:fld>
             <a:endParaRPr lang="de-AT"/>
           </a:p>
@@ -413,7 +413,7 @@
             <a:fld id="{25FA59D5-1C02-4780-AF81-09ADAD492357}" type="datetimeFigureOut">
               <a:rPr lang="de-AT" smtClean="0"/>
               <a:pPr/>
-              <a:t>04.06.2024</a:t>
+              <a:t>06.06.2024</a:t>
             </a:fld>
             <a:endParaRPr lang="de-AT"/>
           </a:p>
@@ -850,7 +850,7 @@
           <a:lstStyle/>
           <a:p>
             <a:r>
-              <a:rPr lang="de-AT"/>
+              <a:rPr lang="de-AT" dirty="0"/>
               <a:t>Mündlich überliefert:</a:t>
             </a:r>
           </a:p>
@@ -860,7 +860,7 @@
               <a:buChar char="•"/>
             </a:pPr>
             <a:r>
-              <a:rPr lang="de-AT"/>
+              <a:rPr lang="de-AT" dirty="0"/>
               <a:t>Motivation der Themenwahl</a:t>
             </a:r>
           </a:p>
@@ -870,7 +870,7 @@
               <a:buChar char="•"/>
             </a:pPr>
             <a:r>
-              <a:rPr lang="de-AT"/>
+              <a:rPr lang="de-AT" dirty="0"/>
               <a:t>Erläuterung der Problemstellung</a:t>
             </a:r>
           </a:p>
@@ -880,7 +880,7 @@
               <a:buChar char="•"/>
             </a:pPr>
             <a:r>
-              <a:rPr lang="de-AT"/>
+              <a:rPr lang="de-AT" dirty="0"/>
               <a:t>Erläuterung des Lösungsansatzes</a:t>
             </a:r>
           </a:p>
@@ -1029,7 +1029,7 @@
             <a:fld id="{7AA6D168-C717-485B-B0C8-699ECBDF2CFF}" type="slidenum">
               <a:rPr lang="de-AT" smtClean="0"/>
               <a:pPr/>
-              <a:t>3</a:t>
+              <a:t>4</a:t>
             </a:fld>
             <a:endParaRPr lang="de-AT"/>
           </a:p>
@@ -1121,7 +1121,7 @@
           <a:p>
             <a:fld id="{903DBAB2-6CCA-40C7-8885-2C056A77E284}" type="datetime1">
               <a:rPr lang="de-AT" smtClean="0"/>
-              <a:t>04.06.2024</a:t>
+              <a:t>06.06.2024</a:t>
             </a:fld>
             <a:endParaRPr lang="de-AT"/>
           </a:p>
@@ -1476,7 +1476,7 @@
           <a:p>
             <a:fld id="{CFFB591F-AE7F-406B-977E-415D708CD05B}" type="datetime1">
               <a:rPr lang="de-AT" smtClean="0"/>
-              <a:t>04.06.2024</a:t>
+              <a:t>06.06.2024</a:t>
             </a:fld>
             <a:endParaRPr lang="de-AT"/>
           </a:p>
@@ -1956,7 +1956,7 @@
           <a:p>
             <a:fld id="{DDED4213-31A7-43A9-B381-650B72838F3D}" type="datetime1">
               <a:rPr lang="de-AT" smtClean="0"/>
-              <a:t>04.06.2024</a:t>
+              <a:t>06.06.2024</a:t>
             </a:fld>
             <a:endParaRPr lang="de-AT"/>
           </a:p>
@@ -2588,7 +2588,7 @@
           <a:p>
             <a:fld id="{73623C63-4118-48BA-956A-11DEEC1AA07D}" type="datetime1">
               <a:rPr lang="de-AT" smtClean="0"/>
-              <a:t>04.06.2024</a:t>
+              <a:t>06.06.2024</a:t>
             </a:fld>
             <a:endParaRPr lang="de-AT"/>
           </a:p>
@@ -2933,7 +2933,7 @@
           <a:p>
             <a:fld id="{D256D3EE-23A3-40C2-AAE3-0430D418E6CE}" type="datetime1">
               <a:rPr lang="de-AT" smtClean="0"/>
-              <a:t>04.06.2024</a:t>
+              <a:t>06.06.2024</a:t>
             </a:fld>
             <a:endParaRPr lang="de-AT"/>
           </a:p>
@@ -3129,7 +3129,7 @@
           <a:p>
             <a:fld id="{3FE2F795-10B4-41AA-AEDE-F815B308DCDB}" type="datetime1">
               <a:rPr lang="de-AT" smtClean="0"/>
-              <a:t>04.06.2024</a:t>
+              <a:t>06.06.2024</a:t>
             </a:fld>
             <a:endParaRPr lang="de-AT"/>
           </a:p>
@@ -3354,7 +3354,7 @@
           <a:p>
             <a:fld id="{03FB355E-663F-46F6-A58A-7E827B834F26}" type="datetime1">
               <a:rPr lang="de-AT" smtClean="0"/>
-              <a:t>04.06.2024</a:t>
+              <a:t>06.06.2024</a:t>
             </a:fld>
             <a:endParaRPr lang="de-AT"/>
           </a:p>
@@ -3884,7 +3884,7 @@
             <a:pPr algn="r"/>
             <a:fld id="{8EA2BAE2-6757-47A9-8E17-82B3704991C6}" type="datetime4">
               <a:rPr lang="de-AT" smtClean="0"/>
-              <a:t>4. Juni 2024</a:t>
+              <a:t>6. Juni 2024</a:t>
             </a:fld>
             <a:endParaRPr lang="de-AT"/>
           </a:p>
@@ -4669,61 +4669,69 @@
               <a:buNone/>
             </a:pPr>
             <a:r>
-              <a:rPr lang="de-AT"/>
+              <a:rPr lang="de-AT" dirty="0"/>
               <a:t>HTL Leoben</a:t>
             </a:r>
           </a:p>
           <a:p>
             <a:r>
-              <a:rPr lang="de-AT"/>
+              <a:rPr lang="de-AT" dirty="0"/>
               <a:t>Container Tracken</a:t>
             </a:r>
           </a:p>
           <a:p>
             <a:pPr lvl="1"/>
             <a:r>
-              <a:rPr lang="de-AT"/>
+              <a:rPr lang="de-AT" dirty="0"/>
               <a:t>Prototypen bauen (Kampl)</a:t>
             </a:r>
           </a:p>
           <a:p>
             <a:pPr lvl="1"/>
             <a:r>
-              <a:rPr lang="de-AT"/>
-              <a:t>Positionierung ermitteln (Gekle)</a:t>
-            </a:r>
-          </a:p>
-          <a:p>
-            <a:r>
-              <a:rPr lang="de-AT"/>
+              <a:rPr lang="de-AT" dirty="0"/>
+              <a:t>Positionierung ermitteln (</a:t>
+            </a:r>
+            <a:r>
+              <a:rPr lang="de-AT" dirty="0" err="1"/>
+              <a:t>Gekle</a:t>
+            </a:r>
+            <a:r>
+              <a:rPr lang="de-AT" dirty="0"/>
+              <a:t>)</a:t>
+            </a:r>
+          </a:p>
+          <a:p>
+            <a:r>
+              <a:rPr lang="de-AT" dirty="0"/>
               <a:t>Umweltdaten auslesen</a:t>
             </a:r>
           </a:p>
           <a:p>
             <a:pPr lvl="1"/>
             <a:r>
-              <a:rPr lang="de-AT"/>
+              <a:rPr lang="de-AT" dirty="0"/>
               <a:t>Daten persistieren (Schrempf)</a:t>
             </a:r>
           </a:p>
           <a:p>
             <a:pPr lvl="1"/>
             <a:r>
-              <a:rPr lang="de-AT"/>
+              <a:rPr lang="de-AT" dirty="0"/>
               <a:t>Daten in Webanwendung anzeigen</a:t>
             </a:r>
           </a:p>
           <a:p>
             <a:pPr lvl="1"/>
-            <a:endParaRPr lang="de-AT"/>
+            <a:endParaRPr lang="de-AT" dirty="0"/>
           </a:p>
           <a:p>
             <a:pPr lvl="1"/>
-            <a:endParaRPr lang="de-AT"/>
+            <a:endParaRPr lang="de-AT" dirty="0"/>
           </a:p>
           <a:p>
             <a:pPr lvl="1"/>
-            <a:endParaRPr lang="de-AT"/>
+            <a:endParaRPr lang="de-AT" dirty="0"/>
           </a:p>
         </p:txBody>
       </p:sp>
@@ -4810,7 +4818,7 @@
           <a:p>
             <a:r>
               <a:rPr lang="de-AT"/>
-              <a:t>Aufgabenverteilung</a:t>
+              <a:t>Ziele</a:t>
             </a:r>
           </a:p>
         </p:txBody>
@@ -4850,94 +4858,66 @@
         <p:spPr/>
         <p:txBody>
           <a:bodyPr>
-            <a:normAutofit fontScale="92500" lnSpcReduction="20000"/>
+            <a:normAutofit/>
           </a:bodyPr>
           <a:lstStyle/>
           <a:p>
             <a:r>
-              <a:rPr lang="de-AT"/>
-              <a:t>Luca Alexander Gekle</a:t>
+              <a:rPr lang="de-DE"/>
+              <a:t>Auslesen der Umweltdaten</a:t>
             </a:r>
           </a:p>
           <a:p>
             <a:pPr lvl="1"/>
             <a:r>
-              <a:rPr lang="de-AT"/>
-              <a:t>Graphentheorie</a:t>
+              <a:rPr lang="de-DE"/>
+              <a:t>Temperatur, Luftfeuchtigkeit und -druck, Erschütterung</a:t>
+            </a:r>
+          </a:p>
+          <a:p>
+            <a:r>
+              <a:rPr lang="de-DE"/>
+              <a:t>Bau von 3 Prototypen welche</a:t>
             </a:r>
           </a:p>
           <a:p>
             <a:pPr lvl="1"/>
             <a:r>
-              <a:rPr lang="de-AT"/>
-              <a:t>Positionsalgorithmus</a:t>
+              <a:rPr lang="de-DE"/>
+              <a:t>Umweltdaten auslesen</a:t>
             </a:r>
           </a:p>
           <a:p>
             <a:pPr lvl="1"/>
             <a:r>
-              <a:rPr lang="de-AT"/>
-              <a:t>Webanwendung</a:t>
-            </a:r>
-          </a:p>
-          <a:p>
-            <a:endParaRPr lang="de-AT"/>
-          </a:p>
-          <a:p>
-            <a:r>
-              <a:rPr lang="de-AT"/>
-              <a:t>Maximilian Silvester Kampl</a:t>
+              <a:rPr lang="de-DE"/>
+              <a:t>Position aussenden mittels Bluetooth</a:t>
             </a:r>
           </a:p>
           <a:p>
             <a:pPr lvl="1"/>
             <a:r>
-              <a:rPr lang="de-AT"/>
-              <a:t>Hardware</a:t>
+              <a:rPr lang="de-DE"/>
+              <a:t>Daten senden mittels MQTT</a:t>
+            </a:r>
+          </a:p>
+          <a:p>
+            <a:r>
+              <a:rPr lang="de-DE"/>
+              <a:t>Tracken von Container mittels GPS</a:t>
+            </a:r>
+          </a:p>
+          <a:p>
+            <a:r>
+              <a:rPr lang="de-DE"/>
+              <a:t>Ermittlung der Position der Container durch Dijkstra Algorithmus</a:t>
             </a:r>
           </a:p>
           <a:p>
             <a:pPr lvl="1"/>
             <a:r>
-              <a:rPr lang="de-AT"/>
-              <a:t>Sensorik</a:t>
-            </a:r>
-          </a:p>
-          <a:p>
-            <a:pPr lvl="1"/>
-            <a:r>
-              <a:rPr lang="de-AT"/>
-              <a:t>MQTT</a:t>
-            </a:r>
-          </a:p>
-          <a:p>
-            <a:endParaRPr lang="de-AT"/>
-          </a:p>
-          <a:p>
-            <a:r>
-              <a:rPr lang="de-AT"/>
-              <a:t>Marko Daniel Schrempf</a:t>
-            </a:r>
-          </a:p>
-          <a:p>
-            <a:pPr lvl="1"/>
-            <a:r>
-              <a:rPr lang="de-AT"/>
-              <a:t>Datenbanken</a:t>
-            </a:r>
-          </a:p>
-          <a:p>
-            <a:pPr lvl="1"/>
-            <a:r>
-              <a:rPr lang="de-AT"/>
-              <a:t>Server</a:t>
-            </a:r>
-          </a:p>
-          <a:p>
-            <a:pPr lvl="1"/>
-            <a:r>
-              <a:rPr lang="de-AT"/>
-              <a:t>REST</a:t>
+              <a:rPr lang="de-DE"/>
+              <a:t>Verminderung der Falschplatzierung, von Containern, auf nahezu 5%</a:t>
             </a:r>
           </a:p>
         </p:txBody>
@@ -4969,7 +4949,7 @@
     </p:spTree>
     <p:extLst>
       <p:ext uri="{BB962C8B-B14F-4D97-AF65-F5344CB8AC3E}">
-        <p14:creationId xmlns:p14="http://schemas.microsoft.com/office/powerpoint/2010/main" val="3173303318"/>
+        <p14:creationId xmlns:p14="http://schemas.microsoft.com/office/powerpoint/2010/main" val="3925678693"/>
       </p:ext>
     </p:extLst>
   </p:cSld>
@@ -5025,7 +5005,7 @@
           <a:p>
             <a:r>
               <a:rPr lang="de-AT"/>
-              <a:t>Ziele</a:t>
+              <a:t>Aufgabenverteilung</a:t>
             </a:r>
           </a:p>
         </p:txBody>
@@ -5065,66 +5045,115 @@
         <p:spPr/>
         <p:txBody>
           <a:bodyPr>
-            <a:normAutofit/>
+            <a:normAutofit fontScale="85000" lnSpcReduction="10000"/>
           </a:bodyPr>
           <a:lstStyle/>
           <a:p>
             <a:r>
-              <a:rPr lang="de-DE"/>
-              <a:t>Auslesen der Umweltdaten</a:t>
-            </a:r>
+              <a:rPr lang="de-AT" dirty="0"/>
+              <a:t>Luca Alexander </a:t>
+            </a:r>
+            <a:r>
+              <a:rPr lang="de-AT" dirty="0" err="1"/>
+              <a:t>Gekle</a:t>
+            </a:r>
+            <a:endParaRPr lang="de-AT" dirty="0"/>
           </a:p>
           <a:p>
             <a:pPr lvl="1"/>
             <a:r>
-              <a:rPr lang="de-DE"/>
-              <a:t>Temperatur, Luftfeuchtigkeit und -druck, Erschütterung</a:t>
-            </a:r>
-          </a:p>
-          <a:p>
-            <a:r>
-              <a:rPr lang="de-DE"/>
-              <a:t>Bau von 3 Prototypen welche</a:t>
+              <a:rPr lang="de-AT" dirty="0"/>
+              <a:t>Graphentheorie</a:t>
             </a:r>
           </a:p>
           <a:p>
             <a:pPr lvl="1"/>
             <a:r>
-              <a:rPr lang="de-DE"/>
-              <a:t>Umweltdaten auslesen</a:t>
+              <a:rPr lang="de-AT" dirty="0"/>
+              <a:t>Positionsalgorithmus</a:t>
             </a:r>
           </a:p>
           <a:p>
             <a:pPr lvl="1"/>
             <a:r>
-              <a:rPr lang="de-DE"/>
-              <a:t>Position aussenden mittels Bluetooth</a:t>
+              <a:rPr lang="de-AT" dirty="0"/>
+              <a:t>Webanwendung</a:t>
+            </a:r>
+          </a:p>
+          <a:p>
+            <a:endParaRPr lang="de-AT" dirty="0"/>
+          </a:p>
+          <a:p>
+            <a:r>
+              <a:rPr lang="de-AT" dirty="0"/>
+              <a:t>Maximilian Silvester Kampl </a:t>
+            </a:r>
+            <a:r>
+              <a:rPr lang="de-AT"/>
+              <a:t>TODO Grafik </a:t>
+            </a:r>
+            <a:r>
+              <a:rPr lang="de-AT" dirty="0"/>
+              <a:t>welche alles beschreibt (</a:t>
+            </a:r>
+            <a:r>
+              <a:rPr lang="de-AT" dirty="0" err="1"/>
+              <a:t>z.B</a:t>
+            </a:r>
+            <a:r>
+              <a:rPr lang="de-AT" dirty="0"/>
+              <a:t> Containerschiff)</a:t>
             </a:r>
           </a:p>
           <a:p>
             <a:pPr lvl="1"/>
             <a:r>
-              <a:rPr lang="de-DE"/>
-              <a:t>Daten senden mittels MQTT</a:t>
-            </a:r>
-          </a:p>
-          <a:p>
-            <a:r>
-              <a:rPr lang="de-DE"/>
-              <a:t>Tracken von Container mittels GPS</a:t>
-            </a:r>
-          </a:p>
-          <a:p>
-            <a:r>
-              <a:rPr lang="de-DE"/>
-              <a:t>Ermittlung der Position der Container durch Dijkstra Algorithmus</a:t>
+              <a:rPr lang="de-AT" dirty="0"/>
+              <a:t>Hardware</a:t>
             </a:r>
           </a:p>
           <a:p>
             <a:pPr lvl="1"/>
             <a:r>
-              <a:rPr lang="de-DE"/>
-              <a:t>Verminderung der Falschplatzierung, von Containern, auf nahezu 5%</a:t>
+              <a:rPr lang="de-AT" dirty="0"/>
+              <a:t>Sensorik</a:t>
+            </a:r>
+          </a:p>
+          <a:p>
+            <a:pPr lvl="1"/>
+            <a:r>
+              <a:rPr lang="de-AT" dirty="0"/>
+              <a:t>MQTT</a:t>
+            </a:r>
+          </a:p>
+          <a:p>
+            <a:endParaRPr lang="de-AT" dirty="0"/>
+          </a:p>
+          <a:p>
+            <a:r>
+              <a:rPr lang="de-AT" dirty="0"/>
+              <a:t>Marko Daniel Schrempf</a:t>
+            </a:r>
+          </a:p>
+          <a:p>
+            <a:pPr lvl="1"/>
+            <a:r>
+              <a:rPr lang="de-AT" dirty="0"/>
+              <a:t>Datenbanken</a:t>
+            </a:r>
+          </a:p>
+          <a:p>
+            <a:pPr lvl="1"/>
+            <a:r>
+              <a:rPr lang="de-AT" dirty="0"/>
+              <a:t>Server</a:t>
+            </a:r>
+          </a:p>
+          <a:p>
+            <a:pPr lvl="1"/>
+            <a:r>
+              <a:rPr lang="de-AT" dirty="0"/>
+              <a:t>REST</a:t>
             </a:r>
           </a:p>
         </p:txBody>
@@ -5156,7 +5185,7 @@
     </p:spTree>
     <p:extLst>
       <p:ext uri="{BB962C8B-B14F-4D97-AF65-F5344CB8AC3E}">
-        <p14:creationId xmlns:p14="http://schemas.microsoft.com/office/powerpoint/2010/main" val="3925678693"/>
+        <p14:creationId xmlns:p14="http://schemas.microsoft.com/office/powerpoint/2010/main" val="3173303318"/>
       </p:ext>
     </p:extLst>
   </p:cSld>
@@ -5246,15 +5275,15 @@
           <a:lstStyle/>
           <a:p>
             <a:r>
-              <a:rPr lang="de-DE"/>
+              <a:rPr lang="de-DE" dirty="0"/>
               <a:t>Bis dato durchgesehen:</a:t>
             </a:r>
-            <a:endParaRPr lang="de-AT"/>
+            <a:endParaRPr lang="de-AT" dirty="0"/>
           </a:p>
           <a:p>
             <a:pPr lvl="1"/>
             <a:r>
-              <a:rPr lang="de-AT" b="0" i="0">
+              <a:rPr lang="de-AT" b="0" i="0" dirty="0">
                 <a:solidFill>
                   <a:srgbClr val="002021"/>
                 </a:solidFill>
@@ -5267,7 +5296,7 @@
               <a:t>REST API Design </a:t>
             </a:r>
             <a:r>
-              <a:rPr lang="de-AT" b="0" i="0" err="1">
+              <a:rPr lang="de-AT" b="0" i="0" dirty="0" err="1">
                 <a:solidFill>
                   <a:srgbClr val="002021"/>
                 </a:solidFill>
@@ -5279,7 +5308,7 @@
               </a:rPr>
               <a:t>Rulebook</a:t>
             </a:r>
-            <a:endParaRPr lang="de-AT" b="0" i="0">
+            <a:endParaRPr lang="de-AT" b="0" i="0" dirty="0">
               <a:solidFill>
                 <a:srgbClr val="002021"/>
               </a:solidFill>
@@ -5292,7 +5321,7 @@
           </a:p>
           <a:p>
             <a:pPr lvl="1"/>
-            <a:endParaRPr lang="de-AT">
+            <a:endParaRPr lang="de-AT" dirty="0">
               <a:solidFill>
                 <a:srgbClr val="002021"/>
               </a:solidFill>
@@ -5304,7 +5333,7 @@
           </a:p>
           <a:p>
             <a:pPr lvl="1"/>
-            <a:endParaRPr lang="de-AT">
+            <a:endParaRPr lang="de-AT" dirty="0">
               <a:solidFill>
                 <a:srgbClr val="002021"/>
               </a:solidFill>
@@ -5316,7 +5345,7 @@
           </a:p>
           <a:p>
             <a:r>
-              <a:rPr lang="de-AT">
+              <a:rPr lang="de-AT" dirty="0">
                 <a:solidFill>
                   <a:srgbClr val="002021"/>
                 </a:solidFill>
@@ -6185,7 +6214,7 @@
         </p:blipFill>
         <p:spPr>
           <a:xfrm>
-            <a:off x="999181" y="1070808"/>
+            <a:off x="969158" y="1039706"/>
             <a:ext cx="10523195" cy="5086830"/>
           </a:xfrm>
           <a:prstGeom prst="rect">

</xml_diff>

<commit_message>
Presentation Gant Diagramm #26
</commit_message>
<xml_diff>
--- a/Diplomarbeit/doc/Presentations/DA-Präsentation2024_Erstpräsentation.pptx
+++ b/Diplomarbeit/doc/Presentations/DA-Präsentation2024_Erstpräsentation.pptx
@@ -5,10 +5,10 @@
     <p:sldMasterId id="2147483648" r:id="rId4"/>
   </p:sldMasterIdLst>
   <p:notesMasterIdLst>
-    <p:notesMasterId r:id="rId23"/>
+    <p:notesMasterId r:id="rId24"/>
   </p:notesMasterIdLst>
   <p:handoutMasterIdLst>
-    <p:handoutMasterId r:id="rId24"/>
+    <p:handoutMasterId r:id="rId25"/>
   </p:handoutMasterIdLst>
   <p:sldIdLst>
     <p:sldId id="256" r:id="rId5"/>
@@ -24,11 +24,12 @@
     <p:sldId id="2584" r:id="rId15"/>
     <p:sldId id="2585" r:id="rId16"/>
     <p:sldId id="2587" r:id="rId17"/>
-    <p:sldId id="2586" r:id="rId18"/>
-    <p:sldId id="2590" r:id="rId19"/>
-    <p:sldId id="2600" r:id="rId20"/>
-    <p:sldId id="2592" r:id="rId21"/>
-    <p:sldId id="2591" r:id="rId22"/>
+    <p:sldId id="2601" r:id="rId18"/>
+    <p:sldId id="2586" r:id="rId19"/>
+    <p:sldId id="2590" r:id="rId20"/>
+    <p:sldId id="2600" r:id="rId21"/>
+    <p:sldId id="2592" r:id="rId22"/>
+    <p:sldId id="2591" r:id="rId23"/>
   </p:sldIdLst>
   <p:sldSz cx="12192000" cy="6858000"/>
   <p:notesSz cx="7099300" cy="10234613"/>
@@ -253,7 +254,7 @@
             <a:fld id="{4597EA2D-D11E-4F11-940E-96FC3DC86B48}" type="datetimeFigureOut">
               <a:rPr lang="de-DE" smtClean="0"/>
               <a:pPr/>
-              <a:t>17.06.2024</a:t>
+              <a:t>19.06.2024</a:t>
             </a:fld>
             <a:endParaRPr lang="de-AT"/>
           </a:p>
@@ -420,7 +421,7 @@
             <a:fld id="{25FA59D5-1C02-4780-AF81-09ADAD492357}" type="datetimeFigureOut">
               <a:rPr lang="de-AT" smtClean="0"/>
               <a:pPr/>
-              <a:t>17.06.2024</a:t>
+              <a:t>19.06.2024</a:t>
             </a:fld>
             <a:endParaRPr lang="de-AT"/>
           </a:p>
@@ -1428,7 +1429,7 @@
           <a:p>
             <a:fld id="{903DBAB2-6CCA-40C7-8885-2C056A77E284}" type="datetime1">
               <a:rPr lang="de-AT" smtClean="0"/>
-              <a:t>17.06.2024</a:t>
+              <a:t>19.06.2024</a:t>
             </a:fld>
             <a:endParaRPr lang="de-AT"/>
           </a:p>
@@ -1783,7 +1784,7 @@
           <a:p>
             <a:fld id="{CFFB591F-AE7F-406B-977E-415D708CD05B}" type="datetime1">
               <a:rPr lang="de-AT" smtClean="0"/>
-              <a:t>17.06.2024</a:t>
+              <a:t>19.06.2024</a:t>
             </a:fld>
             <a:endParaRPr lang="de-AT"/>
           </a:p>
@@ -2263,7 +2264,7 @@
           <a:p>
             <a:fld id="{DDED4213-31A7-43A9-B381-650B72838F3D}" type="datetime1">
               <a:rPr lang="de-AT" smtClean="0"/>
-              <a:t>17.06.2024</a:t>
+              <a:t>19.06.2024</a:t>
             </a:fld>
             <a:endParaRPr lang="de-AT"/>
           </a:p>
@@ -2895,7 +2896,7 @@
           <a:p>
             <a:fld id="{73623C63-4118-48BA-956A-11DEEC1AA07D}" type="datetime1">
               <a:rPr lang="de-AT" smtClean="0"/>
-              <a:t>17.06.2024</a:t>
+              <a:t>19.06.2024</a:t>
             </a:fld>
             <a:endParaRPr lang="de-AT"/>
           </a:p>
@@ -3240,7 +3241,7 @@
           <a:p>
             <a:fld id="{D256D3EE-23A3-40C2-AAE3-0430D418E6CE}" type="datetime1">
               <a:rPr lang="de-AT" smtClean="0"/>
-              <a:t>17.06.2024</a:t>
+              <a:t>19.06.2024</a:t>
             </a:fld>
             <a:endParaRPr lang="de-AT"/>
           </a:p>
@@ -3436,7 +3437,7 @@
           <a:p>
             <a:fld id="{3FE2F795-10B4-41AA-AEDE-F815B308DCDB}" type="datetime1">
               <a:rPr lang="de-AT" smtClean="0"/>
-              <a:t>17.06.2024</a:t>
+              <a:t>19.06.2024</a:t>
             </a:fld>
             <a:endParaRPr lang="de-AT"/>
           </a:p>
@@ -3661,7 +3662,7 @@
           <a:p>
             <a:fld id="{03FB355E-663F-46F6-A58A-7E827B834F26}" type="datetime1">
               <a:rPr lang="de-AT" smtClean="0"/>
-              <a:t>17.06.2024</a:t>
+              <a:t>19.06.2024</a:t>
             </a:fld>
             <a:endParaRPr lang="de-AT"/>
           </a:p>
@@ -4146,8 +4147,8 @@
           <a:p>
             <a:pPr algn="r"/>
             <a:r>
-              <a:rPr lang="nl-NL" sz="2000"/>
-              <a:t>Luca Gekle, Maximilian Kampl, Marko Schrempf </a:t>
+              <a:rPr lang="nl-NL" sz="2000" dirty="0"/>
+              <a:t>Luca A. Gekle, Maximilian S. Kampl, Marko D. Schrempf </a:t>
             </a:r>
           </a:p>
         </p:txBody>
@@ -4191,7 +4192,7 @@
             <a:pPr algn="r"/>
             <a:fld id="{8EA2BAE2-6757-47A9-8E17-82B3704991C6}" type="datetime4">
               <a:rPr lang="de-AT" smtClean="0"/>
-              <a:t>17. Juni 2024</a:t>
+              <a:t>19. Juni 2024</a:t>
             </a:fld>
             <a:endParaRPr lang="de-AT"/>
           </a:p>
@@ -5476,44 +5477,6 @@
                 </a:highlight>
                 <a:latin typeface="Google Sans"/>
               </a:rPr>
-              <a:t>Webseiten:</a:t>
-            </a:r>
-          </a:p>
-          <a:p>
-            <a:pPr lvl="1"/>
-            <a:r>
-              <a:rPr lang="de-DE" dirty="0" err="1">
-                <a:solidFill>
-                  <a:srgbClr val="002021"/>
-                </a:solidFill>
-                <a:highlight>
-                  <a:srgbClr val="FFFFFF"/>
-                </a:highlight>
-                <a:latin typeface="Google Sans"/>
-              </a:rPr>
-              <a:t>wip</a:t>
-            </a:r>
-            <a:endParaRPr lang="de-DE" dirty="0">
-              <a:solidFill>
-                <a:srgbClr val="002021"/>
-              </a:solidFill>
-              <a:highlight>
-                <a:srgbClr val="FFFFFF"/>
-              </a:highlight>
-              <a:latin typeface="Google Sans"/>
-            </a:endParaRPr>
-          </a:p>
-          <a:p>
-            <a:r>
-              <a:rPr lang="de-DE" dirty="0">
-                <a:solidFill>
-                  <a:srgbClr val="002021"/>
-                </a:solidFill>
-                <a:highlight>
-                  <a:srgbClr val="FFFFFF"/>
-                </a:highlight>
-                <a:latin typeface="Google Sans"/>
-              </a:rPr>
               <a:t>Datenblätter:</a:t>
             </a:r>
           </a:p>
@@ -5729,88 +5692,88 @@
           <a:lstStyle/>
           <a:p>
             <a:r>
-              <a:rPr lang="de-DE"/>
+              <a:rPr lang="de-DE" dirty="0"/>
               <a:t>2024-02-23: Genehmigung der DA</a:t>
             </a:r>
           </a:p>
           <a:p>
             <a:pPr lvl="1"/>
             <a:r>
-              <a:rPr lang="de-DE"/>
+              <a:rPr lang="de-DE" dirty="0"/>
               <a:t>Einreichen des Antrags durch die Schüler</a:t>
             </a:r>
           </a:p>
           <a:p>
             <a:pPr lvl="1"/>
             <a:r>
-              <a:rPr lang="de-DE"/>
+              <a:rPr lang="de-DE" dirty="0"/>
               <a:t>DA Dokumentation wurde ausgefüllt und unterschrieben</a:t>
             </a:r>
           </a:p>
           <a:p>
             <a:r>
-              <a:rPr lang="de-DE"/>
+              <a:rPr lang="de-DE" dirty="0"/>
               <a:t>2024-05-09: Projekthandbuch fertig</a:t>
             </a:r>
           </a:p>
           <a:p>
             <a:pPr lvl="1"/>
             <a:r>
-              <a:rPr lang="de-DE"/>
+              <a:rPr lang="de-DE" dirty="0"/>
               <a:t>Zielsetzung ausgefüllt</a:t>
             </a:r>
           </a:p>
           <a:p>
             <a:pPr lvl="1"/>
             <a:r>
-              <a:rPr lang="de-DE"/>
+              <a:rPr lang="de-DE" dirty="0"/>
               <a:t>Projektplan ausgefüllt</a:t>
             </a:r>
           </a:p>
           <a:p>
             <a:r>
-              <a:rPr lang="de-DE"/>
+              <a:rPr lang="de-DE" dirty="0"/>
               <a:t>2024-06-01: Hardware Komponenten Recherche abgeschlossen</a:t>
             </a:r>
           </a:p>
           <a:p>
             <a:pPr lvl="1"/>
             <a:r>
-              <a:rPr lang="de-DE"/>
+              <a:rPr lang="de-DE" dirty="0"/>
               <a:t>Bestimmung der Komponenten</a:t>
             </a:r>
           </a:p>
           <a:p>
             <a:pPr lvl="1"/>
             <a:r>
-              <a:rPr lang="de-DE"/>
+              <a:rPr lang="de-DE" dirty="0"/>
               <a:t>Preisrechnung</a:t>
             </a:r>
           </a:p>
           <a:p>
             <a:pPr lvl="1"/>
             <a:r>
-              <a:rPr lang="de-DE"/>
+              <a:rPr lang="de-DE" dirty="0"/>
               <a:t>Terminrechnung</a:t>
             </a:r>
           </a:p>
           <a:p>
             <a:r>
-              <a:rPr lang="de-DE"/>
+              <a:rPr lang="de-DE" dirty="0"/>
               <a:t>2024-06-17: Datenbanken fertig</a:t>
             </a:r>
           </a:p>
           <a:p>
             <a:pPr lvl="1"/>
             <a:r>
-              <a:rPr lang="de-DE"/>
+              <a:rPr lang="de-DE" dirty="0"/>
               <a:t>Allgemeine Container Informationen</a:t>
             </a:r>
           </a:p>
           <a:p>
             <a:pPr lvl="1"/>
             <a:r>
-              <a:rPr lang="de-DE"/>
+              <a:rPr lang="de-DE" dirty="0"/>
               <a:t>Sensor Daten</a:t>
             </a:r>
           </a:p>
@@ -5969,85 +5932,85 @@
           <a:lstStyle/>
           <a:p>
             <a:r>
-              <a:rPr lang="de-DE"/>
+              <a:rPr lang="de-DE" dirty="0"/>
               <a:t>2024-07-04: Fertige Server Architektur</a:t>
             </a:r>
           </a:p>
           <a:p>
             <a:pPr lvl="1"/>
             <a:r>
-              <a:rPr lang="de-DE"/>
+              <a:rPr lang="de-DE" dirty="0"/>
               <a:t>Server ist einsatzfähig</a:t>
             </a:r>
           </a:p>
           <a:p>
             <a:pPr lvl="1"/>
             <a:r>
-              <a:rPr lang="de-DE"/>
+              <a:rPr lang="de-DE" dirty="0"/>
               <a:t>REST-Schnittstelle</a:t>
             </a:r>
           </a:p>
           <a:p>
             <a:pPr lvl="1"/>
             <a:r>
-              <a:rPr lang="de-DE"/>
+              <a:rPr lang="de-DE" dirty="0"/>
               <a:t>Zugriff kann von überall gestattet werden</a:t>
             </a:r>
           </a:p>
           <a:p>
             <a:r>
-              <a:rPr lang="de-DE"/>
+              <a:rPr lang="de-DE" dirty="0"/>
               <a:t>2024-09-04: Prototyp ist funktionell</a:t>
             </a:r>
           </a:p>
           <a:p>
             <a:pPr lvl="1"/>
             <a:r>
-              <a:rPr lang="de-DE"/>
+              <a:rPr lang="de-DE" dirty="0"/>
               <a:t>Hardware Komponenten gekauft und geliefert</a:t>
             </a:r>
           </a:p>
           <a:p>
             <a:pPr lvl="1"/>
             <a:r>
-              <a:rPr lang="de-DE"/>
+              <a:rPr lang="de-DE" dirty="0"/>
               <a:t>Löten der Komponenten</a:t>
             </a:r>
           </a:p>
           <a:p>
             <a:pPr lvl="1"/>
             <a:r>
-              <a:rPr lang="de-DE"/>
+              <a:rPr lang="de-DE" dirty="0"/>
               <a:t>Datenübertragung mittels MQTT</a:t>
             </a:r>
           </a:p>
           <a:p>
             <a:r>
-              <a:rPr lang="de-DE"/>
+              <a:rPr lang="de-DE" dirty="0"/>
               <a:t>2025-01-31: Webanwendung funktionell</a:t>
             </a:r>
           </a:p>
           <a:p>
             <a:pPr lvl="1"/>
             <a:r>
-              <a:rPr lang="de-DE"/>
+              <a:rPr lang="de-DE" dirty="0"/>
               <a:t>Datenabfrage möglich</a:t>
             </a:r>
           </a:p>
           <a:p>
             <a:pPr lvl="1"/>
             <a:r>
-              <a:rPr lang="de-DE"/>
+              <a:rPr lang="de-DE" dirty="0"/>
               <a:t>Einloggen / Ausloggen möglich</a:t>
             </a:r>
           </a:p>
           <a:p>
             <a:pPr lvl="1"/>
             <a:r>
-              <a:rPr lang="de-DE"/>
+              <a:rPr lang="de-DE" dirty="0"/>
               <a:t>Ansprechendes GUI</a:t>
             </a:r>
-            <a:endParaRPr lang="de-AT"/>
+            <a:endParaRPr lang="de-AT" dirty="0"/>
           </a:p>
         </p:txBody>
       </p:sp>
@@ -6156,7 +6119,7 @@
           <p:cNvPr id="2" name="Titel 1">
             <a:extLst>
               <a:ext uri="{FF2B5EF4-FFF2-40B4-BE49-F238E27FC236}">
-                <a16:creationId xmlns:a16="http://schemas.microsoft.com/office/drawing/2014/main" id="{E496C6BA-99A1-43F4-92B8-B6D762EF0987}"/>
+                <a16:creationId xmlns:a16="http://schemas.microsoft.com/office/drawing/2014/main" id="{3679B119-30DA-D2F0-910C-2E9634305C9E}"/>
               </a:ext>
             </a:extLst>
           </p:cNvPr>
@@ -6173,252 +6136,86 @@
           <a:lstStyle/>
           <a:p>
             <a:r>
+              <a:rPr lang="de-DE" dirty="0"/>
+              <a:t>PM – </a:t>
+            </a:r>
+            <a:r>
               <a:rPr lang="de-DE"/>
-              <a:t>PM - </a:t>
-            </a:r>
+              <a:t>Meilensteine Gant-Diagramm</a:t>
+            </a:r>
+            <a:endParaRPr lang="en-US"/>
+          </a:p>
+        </p:txBody>
+      </p:sp>
+      <p:pic>
+        <p:nvPicPr>
+          <p:cNvPr id="7" name="Inhaltsplatzhalter 6" descr="Ein Bild, das Screenshot, Text, Reihe, Diagramm enthält.&#10;&#10;Automatisch generierte Beschreibung">
+            <a:extLst>
+              <a:ext uri="{FF2B5EF4-FFF2-40B4-BE49-F238E27FC236}">
+                <a16:creationId xmlns:a16="http://schemas.microsoft.com/office/drawing/2014/main" id="{1D516CD1-77AF-F842-89A6-2AB0B319AE62}"/>
+              </a:ext>
+            </a:extLst>
+          </p:cNvPr>
+          <p:cNvPicPr>
+            <a:picLocks noGrp="1" noChangeAspect="1"/>
+          </p:cNvPicPr>
+          <p:nvPr>
+            <p:ph idx="1"/>
+          </p:nvPr>
+        </p:nvPicPr>
+        <p:blipFill>
+          <a:blip r:embed="rId2">
+            <a:extLst>
+              <a:ext uri="{28A0092B-C50C-407E-A947-70E740481C1C}">
+                <a14:useLocalDpi xmlns:a14="http://schemas.microsoft.com/office/drawing/2010/main" val="0"/>
+              </a:ext>
+            </a:extLst>
+          </a:blip>
+          <a:stretch>
+            <a:fillRect/>
+          </a:stretch>
+        </p:blipFill>
+        <p:spPr>
+          <a:xfrm>
+            <a:off x="482009" y="2060539"/>
+            <a:ext cx="11495603" cy="2655255"/>
+          </a:xfrm>
+        </p:spPr>
+      </p:pic>
+      <p:sp>
+        <p:nvSpPr>
+          <p:cNvPr id="4" name="Fußzeilenplatzhalter 3">
+            <a:extLst>
+              <a:ext uri="{FF2B5EF4-FFF2-40B4-BE49-F238E27FC236}">
+                <a16:creationId xmlns:a16="http://schemas.microsoft.com/office/drawing/2014/main" id="{FD7E9FA4-3B81-7798-3F86-7DE52E93901F}"/>
+              </a:ext>
+            </a:extLst>
+          </p:cNvPr>
+          <p:cNvSpPr>
+            <a:spLocks noGrp="1"/>
+          </p:cNvSpPr>
+          <p:nvPr>
+            <p:ph type="ftr" sz="quarter" idx="11"/>
+          </p:nvPr>
+        </p:nvSpPr>
+        <p:spPr/>
+        <p:txBody>
+          <a:bodyPr/>
+          <a:lstStyle/>
+          <a:p>
             <a:r>
               <a:rPr lang="de-AT"/>
-              <a:t>Kostenabschätzung</a:t>
-            </a:r>
-          </a:p>
-        </p:txBody>
-      </p:sp>
-      <p:sp>
-        <p:nvSpPr>
-          <p:cNvPr id="3" name="Inhaltsplatzhalter 2">
+              <a:t>Diplomarbeit Name, Name</a:t>
+            </a:r>
+          </a:p>
+        </p:txBody>
+      </p:sp>
+      <p:sp>
+        <p:nvSpPr>
+          <p:cNvPr id="5" name="Foliennummernplatzhalter 4">
             <a:extLst>
               <a:ext uri="{FF2B5EF4-FFF2-40B4-BE49-F238E27FC236}">
-                <a16:creationId xmlns:a16="http://schemas.microsoft.com/office/drawing/2014/main" id="{A228378C-21E0-453B-B255-71BAC911E6C0}"/>
-              </a:ext>
-            </a:extLst>
-          </p:cNvPr>
-          <p:cNvSpPr>
-            <a:spLocks noGrp="1"/>
-          </p:cNvSpPr>
-          <p:nvPr>
-            <p:ph idx="1"/>
-          </p:nvPr>
-        </p:nvSpPr>
-        <p:spPr/>
-        <p:txBody>
-          <a:bodyPr/>
-          <a:lstStyle/>
-          <a:p>
-            <a:r>
-              <a:rPr lang="de-AT" dirty="0"/>
-              <a:t>Gehalt (nach Kollektivvertrag)</a:t>
-            </a:r>
-          </a:p>
-          <a:p>
-            <a:pPr lvl="1"/>
-            <a:r>
-              <a:rPr lang="en-US" b="0" i="0" dirty="0">
-                <a:solidFill>
-                  <a:srgbClr val="000000"/>
-                </a:solidFill>
-                <a:effectLst/>
-                <a:highlight>
-                  <a:srgbClr val="FFFFFF"/>
-                </a:highlight>
-                <a:latin typeface="DIN-Web-Pro"/>
-              </a:rPr>
-              <a:t>€ 2.192,25 pro Person</a:t>
-            </a:r>
-            <a:endParaRPr lang="de-AT" b="0" i="0" dirty="0">
-              <a:solidFill>
-                <a:srgbClr val="000000"/>
-              </a:solidFill>
-              <a:effectLst/>
-              <a:highlight>
-                <a:srgbClr val="FFFFFF"/>
-              </a:highlight>
-              <a:latin typeface="DIN-Web-Pro"/>
-            </a:endParaRPr>
-          </a:p>
-          <a:p>
-            <a:pPr lvl="1"/>
-            <a:r>
-              <a:rPr lang="de-AT" dirty="0">
-                <a:solidFill>
-                  <a:srgbClr val="000000"/>
-                </a:solidFill>
-                <a:highlight>
-                  <a:srgbClr val="FFFFFF"/>
-                </a:highlight>
-                <a:latin typeface="DIN-Web-Pro"/>
-              </a:rPr>
-              <a:t>€ 6.576,75 insgesamt</a:t>
-            </a:r>
-          </a:p>
-          <a:p>
-            <a:r>
-              <a:rPr lang="de-AT" dirty="0">
-                <a:solidFill>
-                  <a:srgbClr val="000000"/>
-                </a:solidFill>
-                <a:highlight>
-                  <a:srgbClr val="FFFFFF"/>
-                </a:highlight>
-                <a:latin typeface="DIN-Web-Pro"/>
-              </a:rPr>
-              <a:t>Hardware</a:t>
-            </a:r>
-          </a:p>
-          <a:p>
-            <a:pPr lvl="1"/>
-            <a:r>
-              <a:rPr lang="de-AT" dirty="0">
-                <a:solidFill>
-                  <a:srgbClr val="000000"/>
-                </a:solidFill>
-                <a:highlight>
-                  <a:srgbClr val="FFFFFF"/>
-                </a:highlight>
-                <a:latin typeface="DIN-Web-Pro"/>
-              </a:rPr>
-              <a:t>Wissende Kosten: € 70,86</a:t>
-            </a:r>
-          </a:p>
-          <a:p>
-            <a:pPr lvl="2"/>
-            <a:r>
-              <a:rPr lang="de-AT" dirty="0">
-                <a:solidFill>
-                  <a:srgbClr val="000000"/>
-                </a:solidFill>
-                <a:highlight>
-                  <a:srgbClr val="FFFFFF"/>
-                </a:highlight>
-                <a:latin typeface="DIN-Web-Pro"/>
-              </a:rPr>
-              <a:t>3 Prototypen je: € 23,62</a:t>
-            </a:r>
-          </a:p>
-          <a:p>
-            <a:pPr lvl="3"/>
-            <a:r>
-              <a:rPr lang="de-AT" dirty="0">
-                <a:solidFill>
-                  <a:srgbClr val="000000"/>
-                </a:solidFill>
-                <a:highlight>
-                  <a:srgbClr val="FFFFFF"/>
-                </a:highlight>
-                <a:latin typeface="DIN-Web-Pro"/>
-              </a:rPr>
-              <a:t>Esp32: € 13,89</a:t>
-            </a:r>
-          </a:p>
-          <a:p>
-            <a:pPr lvl="3"/>
-            <a:r>
-              <a:rPr lang="de-AT" dirty="0">
-                <a:solidFill>
-                  <a:srgbClr val="000000"/>
-                </a:solidFill>
-                <a:highlight>
-                  <a:srgbClr val="FFFFFF"/>
-                </a:highlight>
-                <a:latin typeface="DIN-Web-Pro"/>
-              </a:rPr>
-              <a:t>GPS-Sensor: € 1,11</a:t>
-            </a:r>
-          </a:p>
-          <a:p>
-            <a:pPr lvl="3"/>
-            <a:r>
-              <a:rPr lang="de-AT" dirty="0">
-                <a:solidFill>
-                  <a:srgbClr val="000000"/>
-                </a:solidFill>
-                <a:highlight>
-                  <a:srgbClr val="FFFFFF"/>
-                </a:highlight>
-                <a:latin typeface="DIN-Web-Pro"/>
-              </a:rPr>
-              <a:t>Vibrationssensor: € 2,72</a:t>
-            </a:r>
-          </a:p>
-          <a:p>
-            <a:pPr lvl="3"/>
-            <a:r>
-              <a:rPr lang="de-AT" dirty="0">
-                <a:solidFill>
-                  <a:srgbClr val="000000"/>
-                </a:solidFill>
-                <a:highlight>
-                  <a:srgbClr val="FFFFFF"/>
-                </a:highlight>
-                <a:latin typeface="DIN-Web-Pro"/>
-              </a:rPr>
-              <a:t>BME 280: € 5,90</a:t>
-            </a:r>
-          </a:p>
-          <a:p>
-            <a:pPr lvl="1"/>
-            <a:r>
-              <a:rPr lang="de-AT" dirty="0">
-                <a:solidFill>
-                  <a:srgbClr val="000000"/>
-                </a:solidFill>
-                <a:highlight>
-                  <a:srgbClr val="FFFFFF"/>
-                </a:highlight>
-                <a:latin typeface="DIN-Web-Pro"/>
-              </a:rPr>
-              <a:t>Maximale Kosten € 200,00</a:t>
-            </a:r>
-          </a:p>
-          <a:p>
-            <a:pPr marL="457200" lvl="1" indent="0">
-              <a:buNone/>
-            </a:pPr>
-            <a:endParaRPr lang="de-AT" dirty="0">
-              <a:solidFill>
-                <a:srgbClr val="000000"/>
-              </a:solidFill>
-              <a:highlight>
-                <a:srgbClr val="FFFFFF"/>
-              </a:highlight>
-              <a:latin typeface="DIN-Web-Pro"/>
-            </a:endParaRPr>
-          </a:p>
-        </p:txBody>
-      </p:sp>
-      <p:sp>
-        <p:nvSpPr>
-          <p:cNvPr id="4" name="Fußzeilenplatzhalter 3">
-            <a:extLst>
-              <a:ext uri="{FF2B5EF4-FFF2-40B4-BE49-F238E27FC236}">
-                <a16:creationId xmlns:a16="http://schemas.microsoft.com/office/drawing/2014/main" id="{8AADA028-308D-430B-A45B-407D875A2351}"/>
-              </a:ext>
-            </a:extLst>
-          </p:cNvPr>
-          <p:cNvSpPr>
-            <a:spLocks noGrp="1"/>
-          </p:cNvSpPr>
-          <p:nvPr>
-            <p:ph type="ftr" sz="quarter" idx="11"/>
-          </p:nvPr>
-        </p:nvSpPr>
-        <p:spPr/>
-        <p:txBody>
-          <a:bodyPr/>
-          <a:lstStyle/>
-          <a:p>
-            <a:r>
-              <a:rPr lang="de-AT"/>
-              <a:t>CONTRUDE Gekle, Kampl, Schrempf</a:t>
-            </a:r>
-          </a:p>
-        </p:txBody>
-      </p:sp>
-      <p:sp>
-        <p:nvSpPr>
-          <p:cNvPr id="5" name="Foliennummernplatzhalter 4">
-            <a:extLst>
-              <a:ext uri="{FF2B5EF4-FFF2-40B4-BE49-F238E27FC236}">
-                <a16:creationId xmlns:a16="http://schemas.microsoft.com/office/drawing/2014/main" id="{AB38338F-922C-40A7-B140-637B827703BF}"/>
+                <a16:creationId xmlns:a16="http://schemas.microsoft.com/office/drawing/2014/main" id="{5B038E27-DEEC-7AFD-5AA2-2E4F9F366D9D}"/>
               </a:ext>
             </a:extLst>
           </p:cNvPr>
@@ -6446,7 +6243,7 @@
     </p:spTree>
     <p:extLst>
       <p:ext uri="{BB962C8B-B14F-4D97-AF65-F5344CB8AC3E}">
-        <p14:creationId xmlns:p14="http://schemas.microsoft.com/office/powerpoint/2010/main" val="1447962708"/>
+        <p14:creationId xmlns:p14="http://schemas.microsoft.com/office/powerpoint/2010/main" val="2445627371"/>
       </p:ext>
     </p:extLst>
   </p:cSld>
@@ -6507,13 +6304,215 @@
           <a:lstStyle/>
           <a:p>
             <a:r>
-              <a:rPr lang="de-DE" dirty="0"/>
-              <a:t>PM – </a:t>
-            </a:r>
+              <a:rPr lang="de-DE"/>
+              <a:t>PM - </a:t>
+            </a:r>
+            <a:r>
+              <a:rPr lang="de-AT"/>
+              <a:t>Kostenabschätzung</a:t>
+            </a:r>
+          </a:p>
+        </p:txBody>
+      </p:sp>
+      <p:sp>
+        <p:nvSpPr>
+          <p:cNvPr id="3" name="Inhaltsplatzhalter 2">
+            <a:extLst>
+              <a:ext uri="{FF2B5EF4-FFF2-40B4-BE49-F238E27FC236}">
+                <a16:creationId xmlns:a16="http://schemas.microsoft.com/office/drawing/2014/main" id="{A228378C-21E0-453B-B255-71BAC911E6C0}"/>
+              </a:ext>
+            </a:extLst>
+          </p:cNvPr>
+          <p:cNvSpPr>
+            <a:spLocks noGrp="1"/>
+          </p:cNvSpPr>
+          <p:nvPr>
+            <p:ph idx="1"/>
+          </p:nvPr>
+        </p:nvSpPr>
+        <p:spPr/>
+        <p:txBody>
+          <a:bodyPr/>
+          <a:lstStyle/>
+          <a:p>
             <a:r>
               <a:rPr lang="de-AT" dirty="0"/>
-              <a:t>Wie wird es gelebt</a:t>
-            </a:r>
+              <a:t>Gehalt (nach Kollektivvertrag)</a:t>
+            </a:r>
+          </a:p>
+          <a:p>
+            <a:pPr lvl="1"/>
+            <a:r>
+              <a:rPr lang="en-US" b="0" i="0" dirty="0">
+                <a:solidFill>
+                  <a:srgbClr val="000000"/>
+                </a:solidFill>
+                <a:effectLst/>
+                <a:highlight>
+                  <a:srgbClr val="FFFFFF"/>
+                </a:highlight>
+                <a:latin typeface="DIN-Web-Pro"/>
+              </a:rPr>
+              <a:t>€ 2.192,25 pro Person</a:t>
+            </a:r>
+            <a:endParaRPr lang="de-AT" b="0" i="0" dirty="0">
+              <a:solidFill>
+                <a:srgbClr val="000000"/>
+              </a:solidFill>
+              <a:effectLst/>
+              <a:highlight>
+                <a:srgbClr val="FFFFFF"/>
+              </a:highlight>
+              <a:latin typeface="DIN-Web-Pro"/>
+            </a:endParaRPr>
+          </a:p>
+          <a:p>
+            <a:pPr lvl="1"/>
+            <a:r>
+              <a:rPr lang="de-AT" dirty="0">
+                <a:solidFill>
+                  <a:srgbClr val="000000"/>
+                </a:solidFill>
+                <a:highlight>
+                  <a:srgbClr val="FFFFFF"/>
+                </a:highlight>
+                <a:latin typeface="DIN-Web-Pro"/>
+              </a:rPr>
+              <a:t>€ 6.576,75 insgesamt</a:t>
+            </a:r>
+          </a:p>
+          <a:p>
+            <a:r>
+              <a:rPr lang="de-AT" dirty="0">
+                <a:solidFill>
+                  <a:srgbClr val="000000"/>
+                </a:solidFill>
+                <a:highlight>
+                  <a:srgbClr val="FFFFFF"/>
+                </a:highlight>
+                <a:latin typeface="DIN-Web-Pro"/>
+              </a:rPr>
+              <a:t>Hardware</a:t>
+            </a:r>
+          </a:p>
+          <a:p>
+            <a:pPr lvl="1"/>
+            <a:r>
+              <a:rPr lang="de-AT" dirty="0">
+                <a:solidFill>
+                  <a:srgbClr val="000000"/>
+                </a:solidFill>
+                <a:highlight>
+                  <a:srgbClr val="FFFFFF"/>
+                </a:highlight>
+                <a:latin typeface="DIN-Web-Pro"/>
+              </a:rPr>
+              <a:t>Wissende Kosten: € 70,86</a:t>
+            </a:r>
+          </a:p>
+          <a:p>
+            <a:pPr lvl="2"/>
+            <a:r>
+              <a:rPr lang="de-AT" dirty="0">
+                <a:solidFill>
+                  <a:srgbClr val="000000"/>
+                </a:solidFill>
+                <a:highlight>
+                  <a:srgbClr val="FFFFFF"/>
+                </a:highlight>
+                <a:latin typeface="DIN-Web-Pro"/>
+              </a:rPr>
+              <a:t>3 Prototypen je: € 23,62</a:t>
+            </a:r>
+          </a:p>
+          <a:p>
+            <a:pPr lvl="3"/>
+            <a:r>
+              <a:rPr lang="de-AT" dirty="0">
+                <a:solidFill>
+                  <a:srgbClr val="000000"/>
+                </a:solidFill>
+                <a:highlight>
+                  <a:srgbClr val="FFFFFF"/>
+                </a:highlight>
+                <a:latin typeface="DIN-Web-Pro"/>
+              </a:rPr>
+              <a:t>Esp32: € 13,89</a:t>
+            </a:r>
+          </a:p>
+          <a:p>
+            <a:pPr lvl="3"/>
+            <a:r>
+              <a:rPr lang="de-AT" dirty="0">
+                <a:solidFill>
+                  <a:srgbClr val="000000"/>
+                </a:solidFill>
+                <a:highlight>
+                  <a:srgbClr val="FFFFFF"/>
+                </a:highlight>
+                <a:latin typeface="DIN-Web-Pro"/>
+              </a:rPr>
+              <a:t>GPS-Sensor: € 1,11</a:t>
+            </a:r>
+          </a:p>
+          <a:p>
+            <a:pPr lvl="3"/>
+            <a:r>
+              <a:rPr lang="de-AT" dirty="0">
+                <a:solidFill>
+                  <a:srgbClr val="000000"/>
+                </a:solidFill>
+                <a:highlight>
+                  <a:srgbClr val="FFFFFF"/>
+                </a:highlight>
+                <a:latin typeface="DIN-Web-Pro"/>
+              </a:rPr>
+              <a:t>Vibrationssensor: € 2,72</a:t>
+            </a:r>
+          </a:p>
+          <a:p>
+            <a:pPr lvl="3"/>
+            <a:r>
+              <a:rPr lang="de-AT" dirty="0">
+                <a:solidFill>
+                  <a:srgbClr val="000000"/>
+                </a:solidFill>
+                <a:highlight>
+                  <a:srgbClr val="FFFFFF"/>
+                </a:highlight>
+                <a:latin typeface="DIN-Web-Pro"/>
+              </a:rPr>
+              <a:t>BME 280: € 5,90</a:t>
+            </a:r>
+          </a:p>
+          <a:p>
+            <a:pPr lvl="1"/>
+            <a:r>
+              <a:rPr lang="de-AT" dirty="0">
+                <a:solidFill>
+                  <a:srgbClr val="000000"/>
+                </a:solidFill>
+                <a:highlight>
+                  <a:srgbClr val="FFFFFF"/>
+                </a:highlight>
+                <a:latin typeface="DIN-Web-Pro"/>
+              </a:rPr>
+              <a:t>Maximale Kosten € 200,00</a:t>
+            </a:r>
+          </a:p>
+          <a:p>
+            <a:pPr marL="457200" lvl="1" indent="0">
+              <a:buNone/>
+            </a:pPr>
+            <a:endParaRPr lang="de-AT" dirty="0">
+              <a:solidFill>
+                <a:srgbClr val="000000"/>
+              </a:solidFill>
+              <a:highlight>
+                <a:srgbClr val="FFFFFF"/>
+              </a:highlight>
+              <a:latin typeface="DIN-Web-Pro"/>
+            </a:endParaRPr>
           </a:p>
         </p:txBody>
       </p:sp>
@@ -6539,7 +6538,7 @@
           <a:lstStyle/>
           <a:p>
             <a:r>
-              <a:rPr lang="de-AT" dirty="0"/>
+              <a:rPr lang="de-AT"/>
               <a:t>CONTRUDE Gekle, Kampl, Schrempf</a:t>
             </a:r>
           </a:p>
@@ -6570,6 +6569,138 @@
               <a:rPr lang="de-AT" smtClean="0"/>
               <a:pPr/>
               <a:t>15</a:t>
+            </a:fld>
+            <a:endParaRPr lang="de-AT"/>
+          </a:p>
+        </p:txBody>
+      </p:sp>
+    </p:spTree>
+    <p:extLst>
+      <p:ext uri="{BB962C8B-B14F-4D97-AF65-F5344CB8AC3E}">
+        <p14:creationId xmlns:p14="http://schemas.microsoft.com/office/powerpoint/2010/main" val="1447962708"/>
+      </p:ext>
+    </p:extLst>
+  </p:cSld>
+  <p:clrMapOvr>
+    <a:masterClrMapping/>
+  </p:clrMapOvr>
+  <mc:AlternateContent xmlns:mc="http://schemas.openxmlformats.org/markup-compatibility/2006" xmlns:p159="http://schemas.microsoft.com/office/powerpoint/2015/09/main">
+    <mc:Choice Requires="p159">
+      <p:transition xmlns:p14="http://schemas.microsoft.com/office/powerpoint/2010/main" spd="slow" p14:dur="2000">
+        <p159:morph option="byObject"/>
+      </p:transition>
+    </mc:Choice>
+    <mc:Fallback xmlns="">
+      <p:transition spd="slow">
+        <p:fade/>
+      </p:transition>
+    </mc:Fallback>
+  </mc:AlternateContent>
+</p:sld>
+</file>
+
+<file path=ppt/slides/slide16.xml><?xml version="1.0" encoding="utf-8"?>
+<p:sld xmlns:a="http://schemas.openxmlformats.org/drawingml/2006/main" xmlns:r="http://schemas.openxmlformats.org/officeDocument/2006/relationships" xmlns:p="http://schemas.openxmlformats.org/presentationml/2006/main">
+  <p:cSld>
+    <p:spTree>
+      <p:nvGrpSpPr>
+        <p:cNvPr id="1" name=""/>
+        <p:cNvGrpSpPr/>
+        <p:nvPr/>
+      </p:nvGrpSpPr>
+      <p:grpSpPr>
+        <a:xfrm>
+          <a:off x="0" y="0"/>
+          <a:ext cx="0" cy="0"/>
+          <a:chOff x="0" y="0"/>
+          <a:chExt cx="0" cy="0"/>
+        </a:xfrm>
+      </p:grpSpPr>
+      <p:sp>
+        <p:nvSpPr>
+          <p:cNvPr id="2" name="Titel 1">
+            <a:extLst>
+              <a:ext uri="{FF2B5EF4-FFF2-40B4-BE49-F238E27FC236}">
+                <a16:creationId xmlns:a16="http://schemas.microsoft.com/office/drawing/2014/main" id="{E496C6BA-99A1-43F4-92B8-B6D762EF0987}"/>
+              </a:ext>
+            </a:extLst>
+          </p:cNvPr>
+          <p:cNvSpPr>
+            <a:spLocks noGrp="1"/>
+          </p:cNvSpPr>
+          <p:nvPr>
+            <p:ph type="title"/>
+          </p:nvPr>
+        </p:nvSpPr>
+        <p:spPr/>
+        <p:txBody>
+          <a:bodyPr/>
+          <a:lstStyle/>
+          <a:p>
+            <a:r>
+              <a:rPr lang="de-DE" dirty="0"/>
+              <a:t>PM – </a:t>
+            </a:r>
+            <a:r>
+              <a:rPr lang="de-AT" dirty="0"/>
+              <a:t>Wie wird es gelebt</a:t>
+            </a:r>
+          </a:p>
+        </p:txBody>
+      </p:sp>
+      <p:sp>
+        <p:nvSpPr>
+          <p:cNvPr id="4" name="Fußzeilenplatzhalter 3">
+            <a:extLst>
+              <a:ext uri="{FF2B5EF4-FFF2-40B4-BE49-F238E27FC236}">
+                <a16:creationId xmlns:a16="http://schemas.microsoft.com/office/drawing/2014/main" id="{8AADA028-308D-430B-A45B-407D875A2351}"/>
+              </a:ext>
+            </a:extLst>
+          </p:cNvPr>
+          <p:cNvSpPr>
+            <a:spLocks noGrp="1"/>
+          </p:cNvSpPr>
+          <p:nvPr>
+            <p:ph type="ftr" sz="quarter" idx="11"/>
+          </p:nvPr>
+        </p:nvSpPr>
+        <p:spPr/>
+        <p:txBody>
+          <a:bodyPr/>
+          <a:lstStyle/>
+          <a:p>
+            <a:r>
+              <a:rPr lang="de-AT" dirty="0"/>
+              <a:t>CONTRUDE Gekle, Kampl, Schrempf</a:t>
+            </a:r>
+          </a:p>
+        </p:txBody>
+      </p:sp>
+      <p:sp>
+        <p:nvSpPr>
+          <p:cNvPr id="5" name="Foliennummernplatzhalter 4">
+            <a:extLst>
+              <a:ext uri="{FF2B5EF4-FFF2-40B4-BE49-F238E27FC236}">
+                <a16:creationId xmlns:a16="http://schemas.microsoft.com/office/drawing/2014/main" id="{AB38338F-922C-40A7-B140-637B827703BF}"/>
+              </a:ext>
+            </a:extLst>
+          </p:cNvPr>
+          <p:cNvSpPr>
+            <a:spLocks noGrp="1"/>
+          </p:cNvSpPr>
+          <p:nvPr>
+            <p:ph type="sldNum" sz="quarter" idx="12"/>
+          </p:nvPr>
+        </p:nvSpPr>
+        <p:spPr/>
+        <p:txBody>
+          <a:bodyPr/>
+          <a:lstStyle/>
+          <a:p>
+            <a:fld id="{7DCD6803-3BAA-44F6-A698-23D950C9713B}" type="slidenum">
+              <a:rPr lang="de-AT" smtClean="0"/>
+              <a:pPr/>
+              <a:t>16</a:t>
             </a:fld>
             <a:endParaRPr lang="de-AT"/>
           </a:p>
@@ -6614,13 +6745,13 @@
   <p:clrMapOvr>
     <a:masterClrMapping/>
   </p:clrMapOvr>
-  <mc:AlternateContent xmlns:mc="http://schemas.openxmlformats.org/markup-compatibility/2006">
-    <mc:Choice xmlns:p159="http://schemas.microsoft.com/office/powerpoint/2015/09/main" Requires="p159">
+  <mc:AlternateContent xmlns:mc="http://schemas.openxmlformats.org/markup-compatibility/2006" xmlns:p159="http://schemas.microsoft.com/office/powerpoint/2015/09/main">
+    <mc:Choice Requires="p159">
       <p:transition xmlns:p14="http://schemas.microsoft.com/office/powerpoint/2010/main" spd="slow" p14:dur="2000">
         <p159:morph option="byObject"/>
       </p:transition>
     </mc:Choice>
-    <mc:Fallback>
+    <mc:Fallback xmlns="">
       <p:transition spd="slow">
         <p:fade/>
       </p:transition>
@@ -6629,7 +6760,7 @@
 </p:sld>
 </file>
 
-<file path=ppt/slides/slide16.xml><?xml version="1.0" encoding="utf-8"?>
+<file path=ppt/slides/slide17.xml><?xml version="1.0" encoding="utf-8"?>
 <p:sld xmlns:a="http://schemas.openxmlformats.org/drawingml/2006/main" xmlns:r="http://schemas.openxmlformats.org/officeDocument/2006/relationships" xmlns:p="http://schemas.openxmlformats.org/presentationml/2006/main">
   <p:cSld>
     <p:spTree>
@@ -6739,7 +6870,7 @@
             <a:fld id="{7DCD6803-3BAA-44F6-A698-23D950C9713B}" type="slidenum">
               <a:rPr lang="de-AT" smtClean="0"/>
               <a:pPr/>
-              <a:t>16</a:t>
+              <a:t>17</a:t>
             </a:fld>
             <a:endParaRPr lang="de-AT"/>
           </a:p>
@@ -6800,7 +6931,7 @@
 </p:sld>
 </file>
 
-<file path=ppt/slides/slide17.xml><?xml version="1.0" encoding="utf-8"?>
+<file path=ppt/slides/slide18.xml><?xml version="1.0" encoding="utf-8"?>
 <p:sld xmlns:a="http://schemas.openxmlformats.org/drawingml/2006/main" xmlns:r="http://schemas.openxmlformats.org/officeDocument/2006/relationships" xmlns:p="http://schemas.openxmlformats.org/presentationml/2006/main">
   <p:cSld>
     <p:spTree>
@@ -6935,7 +7066,7 @@
             <a:fld id="{7DCD6803-3BAA-44F6-A698-23D950C9713B}" type="slidenum">
               <a:rPr lang="de-AT" smtClean="0"/>
               <a:pPr/>
-              <a:t>17</a:t>
+              <a:t>18</a:t>
             </a:fld>
             <a:endParaRPr lang="de-AT"/>
           </a:p>
@@ -6966,7 +7097,7 @@
 </p:sld>
 </file>
 
-<file path=ppt/slides/slide18.xml><?xml version="1.0" encoding="utf-8"?>
+<file path=ppt/slides/slide19.xml><?xml version="1.0" encoding="utf-8"?>
 <p:sld xmlns:a="http://schemas.openxmlformats.org/drawingml/2006/main" xmlns:r="http://schemas.openxmlformats.org/officeDocument/2006/relationships" xmlns:p="http://schemas.openxmlformats.org/presentationml/2006/main">
   <p:cSld>
     <p:spTree>
@@ -7074,16 +7205,16 @@
           <a:lstStyle/>
           <a:p>
             <a:r>
-              <a:rPr lang="de-AT"/>
-              <a:t>CONTRUDE</a:t>
-            </a:r>
-            <a:r>
-              <a:rPr lang="de-AT" b="0"/>
-              <a:t> </a:t>
-            </a:r>
-            <a:r>
-              <a:rPr lang="de-AT"/>
-              <a:t>Schrempf</a:t>
+              <a:rPr lang="de-AT" dirty="0"/>
+              <a:t>CONTRUDE </a:t>
+            </a:r>
+            <a:r>
+              <a:rPr lang="de-AT" dirty="0" err="1"/>
+              <a:t>Gekle</a:t>
+            </a:r>
+            <a:r>
+              <a:rPr lang="de-AT" dirty="0"/>
+              <a:t>, Kampl, Schrempf</a:t>
             </a:r>
           </a:p>
         </p:txBody>
@@ -7112,7 +7243,7 @@
             <a:fld id="{7DCD6803-3BAA-44F6-A698-23D950C9713B}" type="slidenum">
               <a:rPr lang="de-AT" smtClean="0"/>
               <a:pPr/>
-              <a:t>18</a:t>
+              <a:t>19</a:t>
             </a:fld>
             <a:endParaRPr lang="de-AT"/>
           </a:p>
@@ -7225,6 +7356,13 @@
           <a:p>
             <a:pPr lvl="1"/>
             <a:r>
+              <a:rPr lang="de-DE" dirty="0"/>
+              <a:t>n Waren werden beschädigt</a:t>
+            </a:r>
+          </a:p>
+          <a:p>
+            <a:pPr lvl="1"/>
+            <a:r>
               <a:rPr lang="en-US" dirty="0"/>
               <a:t>11.000 </a:t>
             </a:r>
@@ -7365,8 +7503,16 @@
           <a:lstStyle/>
           <a:p>
             <a:r>
-              <a:rPr lang="de-AT"/>
-              <a:t>Diplomarbeit Name, Name</a:t>
+              <a:rPr lang="de-AT" dirty="0"/>
+              <a:t>CONTRUDE </a:t>
+            </a:r>
+            <a:r>
+              <a:rPr lang="de-AT" dirty="0" err="1"/>
+              <a:t>Gekle</a:t>
+            </a:r>
+            <a:r>
+              <a:rPr lang="de-AT" dirty="0"/>
+              <a:t>, Kampl, Schrempf</a:t>
             </a:r>
           </a:p>
         </p:txBody>
@@ -7481,8 +7627,16 @@
           <a:lstStyle/>
           <a:p>
             <a:r>
-              <a:rPr lang="de-AT"/>
-              <a:t>CONTRUDE Gekle, Kampl, Schrempf</a:t>
+              <a:rPr lang="de-AT" dirty="0"/>
+              <a:t>CONTRUDE </a:t>
+            </a:r>
+            <a:r>
+              <a:rPr lang="de-AT" dirty="0" err="1"/>
+              <a:t>Gekle</a:t>
+            </a:r>
+            <a:r>
+              <a:rPr lang="de-AT" dirty="0"/>
+              <a:t>, Kampl, Schrempf</a:t>
             </a:r>
           </a:p>
         </p:txBody>
@@ -10276,12 +10430,16 @@
           <a:lstStyle/>
           <a:p>
             <a:r>
-              <a:rPr lang="de-AT">
-                <a:solidFill>
-                  <a:schemeClr val="bg1"/>
-                </a:solidFill>
-              </a:rPr>
-              <a:t>Diplomarbeit Name, Name</a:t>
+              <a:rPr lang="de-AT" dirty="0"/>
+              <a:t>CONTRUDE </a:t>
+            </a:r>
+            <a:r>
+              <a:rPr lang="de-AT" dirty="0" err="1"/>
+              <a:t>Gekle</a:t>
+            </a:r>
+            <a:r>
+              <a:rPr lang="de-AT" dirty="0"/>
+              <a:t>, Kampl, Schrempf</a:t>
             </a:r>
           </a:p>
         </p:txBody>

</xml_diff>

<commit_message>
updated gantt diagram #26
</commit_message>
<xml_diff>
--- a/Diplomarbeit/doc/Presentations/DA-Präsentation2024_Erstpräsentation.pptx
+++ b/Diplomarbeit/doc/Presentations/DA-Präsentation2024_Erstpräsentation.pptx
@@ -254,7 +254,7 @@
             <a:fld id="{4597EA2D-D11E-4F11-940E-96FC3DC86B48}" type="datetimeFigureOut">
               <a:rPr lang="de-DE" smtClean="0"/>
               <a:pPr/>
-              <a:t>19.06.2024</a:t>
+              <a:t>20.06.2024</a:t>
             </a:fld>
             <a:endParaRPr lang="de-AT"/>
           </a:p>
@@ -421,7 +421,7 @@
             <a:fld id="{25FA59D5-1C02-4780-AF81-09ADAD492357}" type="datetimeFigureOut">
               <a:rPr lang="de-AT" smtClean="0"/>
               <a:pPr/>
-              <a:t>19.06.2024</a:t>
+              <a:t>20.06.2024</a:t>
             </a:fld>
             <a:endParaRPr lang="de-AT"/>
           </a:p>
@@ -1429,7 +1429,7 @@
           <a:p>
             <a:fld id="{903DBAB2-6CCA-40C7-8885-2C056A77E284}" type="datetime1">
               <a:rPr lang="de-AT" smtClean="0"/>
-              <a:t>19.06.2024</a:t>
+              <a:t>20.06.2024</a:t>
             </a:fld>
             <a:endParaRPr lang="de-AT"/>
           </a:p>
@@ -1784,7 +1784,7 @@
           <a:p>
             <a:fld id="{CFFB591F-AE7F-406B-977E-415D708CD05B}" type="datetime1">
               <a:rPr lang="de-AT" smtClean="0"/>
-              <a:t>19.06.2024</a:t>
+              <a:t>20.06.2024</a:t>
             </a:fld>
             <a:endParaRPr lang="de-AT"/>
           </a:p>
@@ -2264,7 +2264,7 @@
           <a:p>
             <a:fld id="{DDED4213-31A7-43A9-B381-650B72838F3D}" type="datetime1">
               <a:rPr lang="de-AT" smtClean="0"/>
-              <a:t>19.06.2024</a:t>
+              <a:t>20.06.2024</a:t>
             </a:fld>
             <a:endParaRPr lang="de-AT"/>
           </a:p>
@@ -2896,7 +2896,7 @@
           <a:p>
             <a:fld id="{73623C63-4118-48BA-956A-11DEEC1AA07D}" type="datetime1">
               <a:rPr lang="de-AT" smtClean="0"/>
-              <a:t>19.06.2024</a:t>
+              <a:t>20.06.2024</a:t>
             </a:fld>
             <a:endParaRPr lang="de-AT"/>
           </a:p>
@@ -3241,7 +3241,7 @@
           <a:p>
             <a:fld id="{D256D3EE-23A3-40C2-AAE3-0430D418E6CE}" type="datetime1">
               <a:rPr lang="de-AT" smtClean="0"/>
-              <a:t>19.06.2024</a:t>
+              <a:t>20.06.2024</a:t>
             </a:fld>
             <a:endParaRPr lang="de-AT"/>
           </a:p>
@@ -3437,7 +3437,7 @@
           <a:p>
             <a:fld id="{3FE2F795-10B4-41AA-AEDE-F815B308DCDB}" type="datetime1">
               <a:rPr lang="de-AT" smtClean="0"/>
-              <a:t>19.06.2024</a:t>
+              <a:t>20.06.2024</a:t>
             </a:fld>
             <a:endParaRPr lang="de-AT"/>
           </a:p>
@@ -3662,7 +3662,7 @@
           <a:p>
             <a:fld id="{03FB355E-663F-46F6-A58A-7E827B834F26}" type="datetime1">
               <a:rPr lang="de-AT" smtClean="0"/>
-              <a:t>19.06.2024</a:t>
+              <a:t>20.06.2024</a:t>
             </a:fld>
             <a:endParaRPr lang="de-AT"/>
           </a:p>
@@ -4192,7 +4192,7 @@
             <a:pPr algn="r"/>
             <a:fld id="{8EA2BAE2-6757-47A9-8E17-82B3704991C6}" type="datetime4">
               <a:rPr lang="de-AT" smtClean="0"/>
-              <a:t>19. Juni 2024</a:t>
+              <a:t>20. Juni 2024</a:t>
             </a:fld>
             <a:endParaRPr lang="de-AT"/>
           </a:p>
@@ -6036,7 +6036,7 @@
           <a:lstStyle/>
           <a:p>
             <a:r>
-              <a:rPr lang="de-AT"/>
+              <a:rPr lang="de-AT" dirty="0"/>
               <a:t>CONTRUDE Gekle, Kampl, Schrempf</a:t>
             </a:r>
           </a:p>
@@ -6137,22 +6137,76 @@
           <a:p>
             <a:r>
               <a:rPr lang="de-DE" dirty="0"/>
-              <a:t>PM – </a:t>
-            </a:r>
-            <a:r>
-              <a:rPr lang="de-DE"/>
-              <a:t>Meilensteine Gant-Diagramm</a:t>
-            </a:r>
-            <a:endParaRPr lang="en-US"/>
+              <a:t>PM – Meilensteine Gantt-Diagramm</a:t>
+            </a:r>
+            <a:endParaRPr lang="en-US" dirty="0"/>
+          </a:p>
+        </p:txBody>
+      </p:sp>
+      <p:sp>
+        <p:nvSpPr>
+          <p:cNvPr id="4" name="Fußzeilenplatzhalter 3">
+            <a:extLst>
+              <a:ext uri="{FF2B5EF4-FFF2-40B4-BE49-F238E27FC236}">
+                <a16:creationId xmlns:a16="http://schemas.microsoft.com/office/drawing/2014/main" id="{FD7E9FA4-3B81-7798-3F86-7DE52E93901F}"/>
+              </a:ext>
+            </a:extLst>
+          </p:cNvPr>
+          <p:cNvSpPr>
+            <a:spLocks noGrp="1"/>
+          </p:cNvSpPr>
+          <p:nvPr>
+            <p:ph type="ftr" sz="quarter" idx="11"/>
+          </p:nvPr>
+        </p:nvSpPr>
+        <p:spPr/>
+        <p:txBody>
+          <a:bodyPr/>
+          <a:lstStyle/>
+          <a:p>
+            <a:r>
+              <a:rPr lang="de-AT" dirty="0"/>
+              <a:t>CONTRUDE Gekle, Kampl, Schrempf</a:t>
+            </a:r>
+          </a:p>
+        </p:txBody>
+      </p:sp>
+      <p:sp>
+        <p:nvSpPr>
+          <p:cNvPr id="5" name="Foliennummernplatzhalter 4">
+            <a:extLst>
+              <a:ext uri="{FF2B5EF4-FFF2-40B4-BE49-F238E27FC236}">
+                <a16:creationId xmlns:a16="http://schemas.microsoft.com/office/drawing/2014/main" id="{5B038E27-DEEC-7AFD-5AA2-2E4F9F366D9D}"/>
+              </a:ext>
+            </a:extLst>
+          </p:cNvPr>
+          <p:cNvSpPr>
+            <a:spLocks noGrp="1"/>
+          </p:cNvSpPr>
+          <p:nvPr>
+            <p:ph type="sldNum" sz="quarter" idx="12"/>
+          </p:nvPr>
+        </p:nvSpPr>
+        <p:spPr/>
+        <p:txBody>
+          <a:bodyPr/>
+          <a:lstStyle/>
+          <a:p>
+            <a:fld id="{7DCD6803-3BAA-44F6-A698-23D950C9713B}" type="slidenum">
+              <a:rPr lang="de-AT" smtClean="0"/>
+              <a:pPr/>
+              <a:t>14</a:t>
+            </a:fld>
+            <a:endParaRPr lang="de-AT"/>
           </a:p>
         </p:txBody>
       </p:sp>
       <p:pic>
         <p:nvPicPr>
-          <p:cNvPr id="7" name="Inhaltsplatzhalter 6" descr="Ein Bild, das Screenshot, Text, Reihe, Diagramm enthält.&#10;&#10;Automatisch generierte Beschreibung">
+          <p:cNvPr id="9" name="Inhaltsplatzhalter 8">
             <a:extLst>
               <a:ext uri="{FF2B5EF4-FFF2-40B4-BE49-F238E27FC236}">
-                <a16:creationId xmlns:a16="http://schemas.microsoft.com/office/drawing/2014/main" id="{1D516CD1-77AF-F842-89A6-2AB0B319AE62}"/>
+                <a16:creationId xmlns:a16="http://schemas.microsoft.com/office/drawing/2014/main" id="{05B562F2-4FDD-D61E-05FD-799223D81774}"/>
               </a:ext>
             </a:extLst>
           </p:cNvPr>
@@ -6177,69 +6231,11 @@
         </p:blipFill>
         <p:spPr>
           <a:xfrm>
-            <a:off x="482009" y="2060539"/>
-            <a:ext cx="11495603" cy="2655255"/>
+            <a:off x="969158" y="2267550"/>
+            <a:ext cx="10613242" cy="2322899"/>
           </a:xfrm>
         </p:spPr>
       </p:pic>
-      <p:sp>
-        <p:nvSpPr>
-          <p:cNvPr id="4" name="Fußzeilenplatzhalter 3">
-            <a:extLst>
-              <a:ext uri="{FF2B5EF4-FFF2-40B4-BE49-F238E27FC236}">
-                <a16:creationId xmlns:a16="http://schemas.microsoft.com/office/drawing/2014/main" id="{FD7E9FA4-3B81-7798-3F86-7DE52E93901F}"/>
-              </a:ext>
-            </a:extLst>
-          </p:cNvPr>
-          <p:cNvSpPr>
-            <a:spLocks noGrp="1"/>
-          </p:cNvSpPr>
-          <p:nvPr>
-            <p:ph type="ftr" sz="quarter" idx="11"/>
-          </p:nvPr>
-        </p:nvSpPr>
-        <p:spPr/>
-        <p:txBody>
-          <a:bodyPr/>
-          <a:lstStyle/>
-          <a:p>
-            <a:r>
-              <a:rPr lang="de-AT"/>
-              <a:t>Diplomarbeit Name, Name</a:t>
-            </a:r>
-          </a:p>
-        </p:txBody>
-      </p:sp>
-      <p:sp>
-        <p:nvSpPr>
-          <p:cNvPr id="5" name="Foliennummernplatzhalter 4">
-            <a:extLst>
-              <a:ext uri="{FF2B5EF4-FFF2-40B4-BE49-F238E27FC236}">
-                <a16:creationId xmlns:a16="http://schemas.microsoft.com/office/drawing/2014/main" id="{5B038E27-DEEC-7AFD-5AA2-2E4F9F366D9D}"/>
-              </a:ext>
-            </a:extLst>
-          </p:cNvPr>
-          <p:cNvSpPr>
-            <a:spLocks noGrp="1"/>
-          </p:cNvSpPr>
-          <p:nvPr>
-            <p:ph type="sldNum" sz="quarter" idx="12"/>
-          </p:nvPr>
-        </p:nvSpPr>
-        <p:spPr/>
-        <p:txBody>
-          <a:bodyPr/>
-          <a:lstStyle/>
-          <a:p>
-            <a:fld id="{7DCD6803-3BAA-44F6-A698-23D950C9713B}" type="slidenum">
-              <a:rPr lang="de-AT" smtClean="0"/>
-              <a:pPr/>
-              <a:t>14</a:t>
-            </a:fld>
-            <a:endParaRPr lang="de-AT"/>
-          </a:p>
-        </p:txBody>
-      </p:sp>
     </p:spTree>
     <p:extLst>
       <p:ext uri="{BB962C8B-B14F-4D97-AF65-F5344CB8AC3E}">
@@ -6337,7 +6333,7 @@
           <a:p>
             <a:r>
               <a:rPr lang="de-AT" dirty="0"/>
-              <a:t>Gehalt (nach Kollektivvertrag)</a:t>
+              <a:t>Gehalt</a:t>
             </a:r>
           </a:p>
           <a:p>

</xml_diff>

<commit_message>
Updated DA-Presentation & Changed pricing
</commit_message>
<xml_diff>
--- a/Diplomarbeit/doc/Presentations/DA-Präsentation2024_Erstpräsentation.pptx
+++ b/Diplomarbeit/doc/Presentations/DA-Präsentation2024_Erstpräsentation.pptx
@@ -176,45 +176,6 @@
 
 <file path=ppt/changesInfos/changesInfo1.xml><?xml version="1.0" encoding="utf-8"?>
 <pc:chgInfo xmlns:a="http://schemas.openxmlformats.org/drawingml/2006/main" xmlns:r="http://schemas.openxmlformats.org/officeDocument/2006/relationships" xmlns:ac="http://schemas.microsoft.com/office/drawing/2013/main/command" xmlns:pc="http://schemas.microsoft.com/office/powerpoint/2013/main/command">
-  <pc:docChgLst>
-    <pc:chgData name="Kampl Maximilian" userId="S::201wita27@o365.htl-leoben.at::4918dfd5-1387-4640-93ab-d05016201330" providerId="AD" clId="Web-{877E458E-2830-48BE-861D-71F57C303B75}"/>
-    <pc:docChg chg="modSld">
-      <pc:chgData name="Kampl Maximilian" userId="S::201wita27@o365.htl-leoben.at::4918dfd5-1387-4640-93ab-d05016201330" providerId="AD" clId="Web-{877E458E-2830-48BE-861D-71F57C303B75}" dt="2024-06-20T16:48:49.531" v="21"/>
-      <pc:docMkLst>
-        <pc:docMk/>
-      </pc:docMkLst>
-      <pc:sldChg chg="addSp modSp">
-        <pc:chgData name="Kampl Maximilian" userId="S::201wita27@o365.htl-leoben.at::4918dfd5-1387-4640-93ab-d05016201330" providerId="AD" clId="Web-{877E458E-2830-48BE-861D-71F57C303B75}" dt="2024-06-20T16:48:49.531" v="21"/>
-        <pc:sldMkLst>
-          <pc:docMk/>
-          <pc:sldMk cId="2395814003" sldId="2593"/>
-        </pc:sldMkLst>
-        <pc:spChg chg="add mod">
-          <ac:chgData name="Kampl Maximilian" userId="S::201wita27@o365.htl-leoben.at::4918dfd5-1387-4640-93ab-d05016201330" providerId="AD" clId="Web-{877E458E-2830-48BE-861D-71F57C303B75}" dt="2024-06-20T16:48:49.531" v="21"/>
-          <ac:spMkLst>
-            <pc:docMk/>
-            <pc:sldMk cId="2395814003" sldId="2593"/>
-            <ac:spMk id="2" creationId="{73220638-C94E-09A1-A125-27B6E9EA2614}"/>
-          </ac:spMkLst>
-        </pc:spChg>
-      </pc:sldChg>
-      <pc:sldChg chg="addSp modSp">
-        <pc:chgData name="Kampl Maximilian" userId="S::201wita27@o365.htl-leoben.at::4918dfd5-1387-4640-93ab-d05016201330" providerId="AD" clId="Web-{877E458E-2830-48BE-861D-71F57C303B75}" dt="2024-06-20T16:47:23.228" v="15" actId="1076"/>
-        <pc:sldMkLst>
-          <pc:docMk/>
-          <pc:sldMk cId="1061074841" sldId="2596"/>
-        </pc:sldMkLst>
-        <pc:spChg chg="add mod">
-          <ac:chgData name="Kampl Maximilian" userId="S::201wita27@o365.htl-leoben.at::4918dfd5-1387-4640-93ab-d05016201330" providerId="AD" clId="Web-{877E458E-2830-48BE-861D-71F57C303B75}" dt="2024-06-20T16:47:23.228" v="15" actId="1076"/>
-          <ac:spMkLst>
-            <pc:docMk/>
-            <pc:sldMk cId="1061074841" sldId="2596"/>
-            <ac:spMk id="2" creationId="{548018E2-51E9-7B56-D95A-411BB36F543B}"/>
-          </ac:spMkLst>
-        </pc:spChg>
-      </pc:sldChg>
-    </pc:docChg>
-  </pc:docChgLst>
   <pc:docChgLst>
     <pc:chgData name="Kampl Maximilian" userId="S::201wita27@o365.htl-leoben.at::4918dfd5-1387-4640-93ab-d05016201330" providerId="AD" clId="Web-{C31EE056-261C-469D-8615-8658228AB120}"/>
     <pc:docChg chg="modSld">
@@ -435,6 +396,45 @@
     </pc:docChg>
   </pc:docChgLst>
   <pc:docChgLst>
+    <pc:chgData name="Kampl Maximilian" userId="S::201wita27@o365.htl-leoben.at::4918dfd5-1387-4640-93ab-d05016201330" providerId="AD" clId="Web-{877E458E-2830-48BE-861D-71F57C303B75}"/>
+    <pc:docChg chg="modSld">
+      <pc:chgData name="Kampl Maximilian" userId="S::201wita27@o365.htl-leoben.at::4918dfd5-1387-4640-93ab-d05016201330" providerId="AD" clId="Web-{877E458E-2830-48BE-861D-71F57C303B75}" dt="2024-06-20T16:48:49.531" v="21"/>
+      <pc:docMkLst>
+        <pc:docMk/>
+      </pc:docMkLst>
+      <pc:sldChg chg="addSp modSp">
+        <pc:chgData name="Kampl Maximilian" userId="S::201wita27@o365.htl-leoben.at::4918dfd5-1387-4640-93ab-d05016201330" providerId="AD" clId="Web-{877E458E-2830-48BE-861D-71F57C303B75}" dt="2024-06-20T16:48:49.531" v="21"/>
+        <pc:sldMkLst>
+          <pc:docMk/>
+          <pc:sldMk cId="2395814003" sldId="2593"/>
+        </pc:sldMkLst>
+        <pc:spChg chg="add mod">
+          <ac:chgData name="Kampl Maximilian" userId="S::201wita27@o365.htl-leoben.at::4918dfd5-1387-4640-93ab-d05016201330" providerId="AD" clId="Web-{877E458E-2830-48BE-861D-71F57C303B75}" dt="2024-06-20T16:48:49.531" v="21"/>
+          <ac:spMkLst>
+            <pc:docMk/>
+            <pc:sldMk cId="2395814003" sldId="2593"/>
+            <ac:spMk id="2" creationId="{73220638-C94E-09A1-A125-27B6E9EA2614}"/>
+          </ac:spMkLst>
+        </pc:spChg>
+      </pc:sldChg>
+      <pc:sldChg chg="addSp modSp">
+        <pc:chgData name="Kampl Maximilian" userId="S::201wita27@o365.htl-leoben.at::4918dfd5-1387-4640-93ab-d05016201330" providerId="AD" clId="Web-{877E458E-2830-48BE-861D-71F57C303B75}" dt="2024-06-20T16:47:23.228" v="15" actId="1076"/>
+        <pc:sldMkLst>
+          <pc:docMk/>
+          <pc:sldMk cId="1061074841" sldId="2596"/>
+        </pc:sldMkLst>
+        <pc:spChg chg="add mod">
+          <ac:chgData name="Kampl Maximilian" userId="S::201wita27@o365.htl-leoben.at::4918dfd5-1387-4640-93ab-d05016201330" providerId="AD" clId="Web-{877E458E-2830-48BE-861D-71F57C303B75}" dt="2024-06-20T16:47:23.228" v="15" actId="1076"/>
+          <ac:spMkLst>
+            <pc:docMk/>
+            <pc:sldMk cId="1061074841" sldId="2596"/>
+            <ac:spMk id="2" creationId="{548018E2-51E9-7B56-D95A-411BB36F543B}"/>
+          </ac:spMkLst>
+        </pc:spChg>
+      </pc:sldChg>
+    </pc:docChg>
+  </pc:docChgLst>
+  <pc:docChgLst>
     <pc:chgData name="Kampl Maximilian" userId="4918dfd5-1387-4640-93ab-d05016201330" providerId="ADAL" clId="{471A55EF-552C-4C56-9006-996C359C77F2}"/>
     <pc:docChg chg="modSld">
       <pc:chgData name="Kampl Maximilian" userId="4918dfd5-1387-4640-93ab-d05016201330" providerId="ADAL" clId="{471A55EF-552C-4C56-9006-996C359C77F2}" dt="2024-06-20T17:15:30.910" v="101" actId="403"/>
@@ -596,7 +596,7 @@
             <a:fld id="{4597EA2D-D11E-4F11-940E-96FC3DC86B48}" type="datetimeFigureOut">
               <a:rPr lang="de-DE" smtClean="0"/>
               <a:pPr/>
-              <a:t>21.06.2024</a:t>
+              <a:t>21.10.2024</a:t>
             </a:fld>
             <a:endParaRPr lang="de-AT"/>
           </a:p>
@@ -763,7 +763,7 @@
             <a:fld id="{25FA59D5-1C02-4780-AF81-09ADAD492357}" type="datetimeFigureOut">
               <a:rPr lang="de-AT" smtClean="0"/>
               <a:pPr/>
-              <a:t>21.06.2024</a:t>
+              <a:t>21.10.2024</a:t>
             </a:fld>
             <a:endParaRPr lang="de-AT"/>
           </a:p>
@@ -1771,7 +1771,7 @@
           <a:p>
             <a:fld id="{903DBAB2-6CCA-40C7-8885-2C056A77E284}" type="datetime1">
               <a:rPr lang="de-AT" smtClean="0"/>
-              <a:t>21.06.2024</a:t>
+              <a:t>21.10.2024</a:t>
             </a:fld>
             <a:endParaRPr lang="de-AT"/>
           </a:p>
@@ -2126,7 +2126,7 @@
           <a:p>
             <a:fld id="{CFFB591F-AE7F-406B-977E-415D708CD05B}" type="datetime1">
               <a:rPr lang="de-AT" smtClean="0"/>
-              <a:t>21.06.2024</a:t>
+              <a:t>21.10.2024</a:t>
             </a:fld>
             <a:endParaRPr lang="de-AT"/>
           </a:p>
@@ -2606,7 +2606,7 @@
           <a:p>
             <a:fld id="{DDED4213-31A7-43A9-B381-650B72838F3D}" type="datetime1">
               <a:rPr lang="de-AT" smtClean="0"/>
-              <a:t>21.06.2024</a:t>
+              <a:t>21.10.2024</a:t>
             </a:fld>
             <a:endParaRPr lang="de-AT"/>
           </a:p>
@@ -3238,7 +3238,7 @@
           <a:p>
             <a:fld id="{73623C63-4118-48BA-956A-11DEEC1AA07D}" type="datetime1">
               <a:rPr lang="de-AT" smtClean="0"/>
-              <a:t>21.06.2024</a:t>
+              <a:t>21.10.2024</a:t>
             </a:fld>
             <a:endParaRPr lang="de-AT"/>
           </a:p>
@@ -3583,7 +3583,7 @@
           <a:p>
             <a:fld id="{D256D3EE-23A3-40C2-AAE3-0430D418E6CE}" type="datetime1">
               <a:rPr lang="de-AT" smtClean="0"/>
-              <a:t>21.06.2024</a:t>
+              <a:t>21.10.2024</a:t>
             </a:fld>
             <a:endParaRPr lang="de-AT"/>
           </a:p>
@@ -3779,7 +3779,7 @@
           <a:p>
             <a:fld id="{3FE2F795-10B4-41AA-AEDE-F815B308DCDB}" type="datetime1">
               <a:rPr lang="de-AT" smtClean="0"/>
-              <a:t>21.06.2024</a:t>
+              <a:t>21.10.2024</a:t>
             </a:fld>
             <a:endParaRPr lang="de-AT"/>
           </a:p>
@@ -4004,7 +4004,7 @@
           <a:p>
             <a:fld id="{03FB355E-663F-46F6-A58A-7E827B834F26}" type="datetime1">
               <a:rPr lang="de-AT" smtClean="0"/>
-              <a:t>21.06.2024</a:t>
+              <a:t>21.10.2024</a:t>
             </a:fld>
             <a:endParaRPr lang="de-AT"/>
           </a:p>
@@ -4534,7 +4534,7 @@
             <a:pPr algn="r"/>
             <a:fld id="{8EA2BAE2-6757-47A9-8E17-82B3704991C6}" type="datetime4">
               <a:rPr lang="de-AT" smtClean="0"/>
-              <a:t>21. Juni 2024</a:t>
+              <a:t>21. Oktober 2024</a:t>
             </a:fld>
             <a:endParaRPr lang="de-AT"/>
           </a:p>
@@ -8284,60 +8284,60 @@
           <a:lstStyle/>
           <a:p>
             <a:r>
-              <a:rPr lang="de-DE"/>
+              <a:rPr lang="de-DE" dirty="0"/>
               <a:t>Auslesen der Umweltdaten</a:t>
             </a:r>
           </a:p>
           <a:p>
             <a:pPr lvl="1"/>
             <a:r>
-              <a:rPr lang="de-DE"/>
+              <a:rPr lang="de-DE" dirty="0"/>
               <a:t>Temperatur, Luftfeuchtigkeit und -druck, Erschütterung</a:t>
             </a:r>
           </a:p>
           <a:p>
             <a:r>
-              <a:rPr lang="de-DE"/>
+              <a:rPr lang="de-DE" dirty="0"/>
               <a:t>Bau von 3 Prototypen welche</a:t>
             </a:r>
           </a:p>
           <a:p>
             <a:pPr lvl="1"/>
             <a:r>
-              <a:rPr lang="de-DE"/>
+              <a:rPr lang="de-DE" dirty="0"/>
               <a:t>Umweltdaten auslesen</a:t>
             </a:r>
           </a:p>
           <a:p>
             <a:pPr lvl="1"/>
             <a:r>
-              <a:rPr lang="de-DE"/>
+              <a:rPr lang="de-DE" dirty="0"/>
               <a:t>Position aussenden mittels Bluetooth</a:t>
             </a:r>
           </a:p>
           <a:p>
             <a:pPr lvl="1"/>
             <a:r>
-              <a:rPr lang="de-DE"/>
+              <a:rPr lang="de-DE" dirty="0"/>
               <a:t>Daten senden mittels MQTT</a:t>
             </a:r>
           </a:p>
           <a:p>
             <a:r>
-              <a:rPr lang="de-DE"/>
+              <a:rPr lang="de-DE" dirty="0"/>
               <a:t>Tracken von Container mittels GPS</a:t>
             </a:r>
           </a:p>
           <a:p>
             <a:r>
-              <a:rPr lang="de-DE"/>
+              <a:rPr lang="de-DE" dirty="0"/>
               <a:t>Ermittlung der Position der Container durch Dijkstra Algorithmus</a:t>
             </a:r>
           </a:p>
           <a:p>
             <a:pPr lvl="1"/>
             <a:r>
-              <a:rPr lang="de-DE"/>
+              <a:rPr lang="de-DE" dirty="0"/>
               <a:t>Verminderung der Falschplatzierung, von Containern, auf nahezu 5%</a:t>
             </a:r>
           </a:p>
@@ -12136,15 +12136,6 @@
 </file>
 
 <file path=customXml/item1.xml><?xml version="1.0" encoding="utf-8"?>
-<?mso-contentType ?>
-<FormTemplates xmlns="http://schemas.microsoft.com/sharepoint/v3/contenttype/forms">
-  <Display>DocumentLibraryForm</Display>
-  <Edit>DocumentLibraryForm</Edit>
-  <New>DocumentLibraryForm</New>
-</FormTemplates>
-</file>
-
-<file path=customXml/item2.xml><?xml version="1.0" encoding="utf-8"?>
 <ct:contentTypeSchema xmlns:ct="http://schemas.microsoft.com/office/2006/metadata/contentType" xmlns:ma="http://schemas.microsoft.com/office/2006/metadata/properties/metaAttributes" ct:_="" ma:_="" ma:contentTypeName="Dokument" ma:contentTypeID="0x010100AEC342486E2AC5419469D1A36EC3682B" ma:contentTypeVersion="4" ma:contentTypeDescription="Ein neues Dokument erstellen." ma:contentTypeScope="" ma:versionID="3fa14d8831e4b125e814b54aaa4122bb">
   <xsd:schema xmlns:xsd="http://www.w3.org/2001/XMLSchema" xmlns:xs="http://www.w3.org/2001/XMLSchema" xmlns:p="http://schemas.microsoft.com/office/2006/metadata/properties" xmlns:ns2="025117e9-99fa-48ff-aab4-bb37753ec9db" targetNamespace="http://schemas.microsoft.com/office/2006/metadata/properties" ma:root="true" ma:fieldsID="c273f986753a84b21935896d46e76ffa" ns2:_="">
     <xsd:import namespace="025117e9-99fa-48ff-aab4-bb37753ec9db"/>
@@ -12288,6 +12279,15 @@
 </ct:contentTypeSchema>
 </file>
 
+<file path=customXml/item2.xml><?xml version="1.0" encoding="utf-8"?>
+<?mso-contentType ?>
+<FormTemplates xmlns="http://schemas.microsoft.com/sharepoint/v3/contenttype/forms">
+  <Display>DocumentLibraryForm</Display>
+  <Edit>DocumentLibraryForm</Edit>
+  <New>DocumentLibraryForm</New>
+</FormTemplates>
+</file>
+
 <file path=customXml/item3.xml><?xml version="1.0" encoding="utf-8"?>
 <p:properties xmlns:p="http://schemas.microsoft.com/office/2006/metadata/properties" xmlns:xsi="http://www.w3.org/2001/XMLSchema-instance" xmlns:pc="http://schemas.microsoft.com/office/infopath/2007/PartnerControls">
   <documentManagement/>
@@ -12295,14 +12295,6 @@
 </file>
 
 <file path=customXml/itemProps1.xml><?xml version="1.0" encoding="utf-8"?>
-<ds:datastoreItem xmlns:ds="http://schemas.openxmlformats.org/officeDocument/2006/customXml" ds:itemID="{A62B322D-2084-418A-8960-B074ADC5B6DB}">
-  <ds:schemaRefs>
-    <ds:schemaRef ds:uri="http://schemas.microsoft.com/sharepoint/v3/contenttype/forms"/>
-  </ds:schemaRefs>
-</ds:datastoreItem>
-</file>
-
-<file path=customXml/itemProps2.xml><?xml version="1.0" encoding="utf-8"?>
 <ds:datastoreItem xmlns:ds="http://schemas.openxmlformats.org/officeDocument/2006/customXml" ds:itemID="{112BE4CD-0DD7-4283-8B22-B94F084D1F44}">
   <ds:schemaRefs>
     <ds:schemaRef ds:uri="025117e9-99fa-48ff-aab4-bb37753ec9db"/>
@@ -12316,6 +12308,14 @@
     <ds:schemaRef ds:uri="http://schemas.microsoft.com/office/infopath/2007/PartnerControls"/>
     <ds:schemaRef ds:uri="http://schemas.openxmlformats.org/package/2006/metadata/core-properties"/>
     <ds:schemaRef ds:uri="http://www.w3.org/2001/XMLSchema"/>
+  </ds:schemaRefs>
+</ds:datastoreItem>
+</file>
+
+<file path=customXml/itemProps2.xml><?xml version="1.0" encoding="utf-8"?>
+<ds:datastoreItem xmlns:ds="http://schemas.openxmlformats.org/officeDocument/2006/customXml" ds:itemID="{A62B322D-2084-418A-8960-B074ADC5B6DB}">
+  <ds:schemaRefs>
+    <ds:schemaRef ds:uri="http://schemas.microsoft.com/sharepoint/v3/contenttype/forms"/>
   </ds:schemaRefs>
 </ds:datastoreItem>
 </file>

</xml_diff>